<commit_message>
New versions of slides
</commit_message>
<xml_diff>
--- a/slides/04-PKI-and-Key-distribution-2020.pptx
+++ b/slides/04-PKI-and-Key-distribution-2020.pptx
@@ -5,7 +5,7 @@
     <p:sldMasterId id="2147483648" r:id="rId1"/>
   </p:sldMasterIdLst>
   <p:notesMasterIdLst>
-    <p:notesMasterId r:id="rId30"/>
+    <p:notesMasterId r:id="rId31"/>
   </p:notesMasterIdLst>
   <p:sldIdLst>
     <p:sldId id="256" r:id="rId2"/>
@@ -25,17 +25,18 @@
     <p:sldId id="343" r:id="rId16"/>
     <p:sldId id="327" r:id="rId17"/>
     <p:sldId id="341" r:id="rId18"/>
-    <p:sldId id="345" r:id="rId19"/>
-    <p:sldId id="342" r:id="rId20"/>
-    <p:sldId id="328" r:id="rId21"/>
-    <p:sldId id="333" r:id="rId22"/>
-    <p:sldId id="329" r:id="rId23"/>
-    <p:sldId id="330" r:id="rId24"/>
-    <p:sldId id="344" r:id="rId25"/>
-    <p:sldId id="331" r:id="rId26"/>
-    <p:sldId id="320" r:id="rId27"/>
-    <p:sldId id="321" r:id="rId28"/>
-    <p:sldId id="339" r:id="rId29"/>
+    <p:sldId id="346" r:id="rId19"/>
+    <p:sldId id="345" r:id="rId20"/>
+    <p:sldId id="342" r:id="rId21"/>
+    <p:sldId id="328" r:id="rId22"/>
+    <p:sldId id="333" r:id="rId23"/>
+    <p:sldId id="329" r:id="rId24"/>
+    <p:sldId id="330" r:id="rId25"/>
+    <p:sldId id="344" r:id="rId26"/>
+    <p:sldId id="331" r:id="rId27"/>
+    <p:sldId id="320" r:id="rId28"/>
+    <p:sldId id="321" r:id="rId29"/>
+    <p:sldId id="339" r:id="rId30"/>
   </p:sldIdLst>
   <p:sldSz cx="12192000" cy="6858000"/>
   <p:notesSz cx="6858000" cy="9144000"/>
@@ -295,7 +296,7 @@
   <inkml:trace contextRef="#ctx0" brushRef="#br0" timeOffset="6090.53">8732 13498 0,'0'0'0,"0"0"0,0 0 16,0 0-1,0 0-15,0 0 16,0 0-16,10 44 16,0-9-1,0 16-15,0 18 16,0 17 0,-1 5-16,1-2 15,0-8-15,0-5 16,0-2-1,-5-5-15,0-8 16,-1-6-16,1-14 16,-5-9-1,5-7-15,-5-5 16,5-8-16,-5-2 16,0-5-1</inkml:trace>
   <inkml:trace contextRef="#ctx0" brushRef="#br0" timeOffset="6448.06">9273 13370 0,'0'0'16,"0"0"-16,0 0 16,0 0-16,0 0 15,0 0 1,0 44-16,5-2 16,0 27-16,0 22 15,5 15 1,-5 7-16,0 0 15,0-7 1,0-5-16,-5-8 16,5-9-16,0-10 15,-5-6 1,-5 4-16,0 14 16</inkml:trace>
   <inkml:trace contextRef="#ctx0" brushRef="#br0" timeOffset="8547.27">8895 14912 0,'0'0'0,"0"0"16,0 0-16,-30-22 15,10 3-15,1-4 16,-1-1 0,5 2-16,1 4 15,4 6 1,5 5-16,0 2 16,0 2-16,5 1 15,-5 2 1,5 0-16,0 0 15,0 2-15,0 1 16,0-1 0,0-2-16,0 0 15,0 0 1,25 47-16,-11-20 16,11 3-16,5-3 15,9 0 1,0-5-16,10-5 15,1-2-15,-1-3 16,-5-4 0,0-4-16,1-1 15,-6-1-15,5-4 16,1-3 0,9-2-16,0-3 15,0 0-15,-10-2 16,-4-1-1,-11 3-15,-4 1 16,-1-4 0,-9 3-16,0 1 15,0-1-15,-1 0 16,1 3 0,-5-1-16,5 1 15,-5-1-15,-1 1 16,1 0-1,-5-1-15,5 1 16,-5 0-16,0-1 16,-5-2-1,0 0-15,0 10 16,-5-24-16,-5 7 16,-10-3-1,-4 0-15,-16 1 16,-14-1-1,-20 0-15,-14 3 16,-25 0-16,-10 0 16,5 2-1,19 3-15,26 4 16,23 3-16,11 5 16,9 3-1,6 2-15,9 2 16,0 0-16,6 6 15,4 1 1,-5 4-16,5 4 16,0 0-1,5 0-15,-5-2 16,5-3-16,-5-5 16,5-2-16,0-2 15,0-4 1,0-1-16,0-1 15,0 1 1,0-1-16,0-2 16,0 0-16,0 0 15,0 0 1,0 0-16,0 0 16,0-2-16,0-1 15,0 1 1,0-1-16,0 1 15,0 0 1,0 2-16,0 0 16,0 0-16,0 0 15,0 0 1,10 19-16,-10-2 16,5 8-16,0 9 15,5 18 1,-1 15-16,1 21 15,0 15-15,0 8 16,0-3 0,5-4-16,-6-13 15,6-13 1,-5-14-16,0-14 16,0-9-16,0-4 15,-1-2 1,1-8-16,-5-5 15,0-5-15,0-5 16,0-2 0,0-5-16,-5-2 15,5-3-15</inkml:trace>
-  <inkml:trace contextRef="#ctx0" brushRef="#br0" timeOffset="9573.35">9879 14728 0,'0'0'0,"0"0"15,0 0-15,0 0 16,0 0-16,0 0 16,0 0-1,0 0-15,0 0 16,0 0-1,0 0-15,9 29 16,1 13-16,5 17 16,0 15-1,-5 7-15,-1 3 16,1-1-16,-10-4 16,5-5-1,-5-3-15,0-2 16,5-2-16,-5-8 15,0-8 1,0-6-16,0-11 16,0-4-1,0-8-15,0-5 16,0-5-16,0-2 16,0-3-16,0-2 15,0 0 1,0 0-16,0-2 15,0-1 1,0 1-16,0 1 16,0 1-16,5 0 15,-5 3 1,5 2-16,-5-1 16,5 1-16,0 0 15,-5 2 1,0-2-16,0 0 15,0 0-15,0 2 16,-5 0 0,-5 1-16,0 2 15,0 2 1,-4 2-16,-6 4 16,-5 4-16,1 2 15,-6 3 1,-4 0-16,4-2 15,-4-3-15,-6-3 16,1-2 0,0-4-16,-1-4 15,1-4-15,-5-2 16,4-3 0,-4-3-16,-5-2 15,-5-2-15,-10-6 16,-5-4-1,0-3-15,5-5 16,15 1 0,10-1-16,9 0 15,6 1-15,4 2 16,0-3 0,0-2-16</inkml:trace>
+  <inkml:trace contextRef="#ctx0" brushRef="#br0" timeOffset="9573.34">9879 14728 0,'0'0'0,"0"0"15,0 0-15,0 0 16,0 0-16,0 0 16,0 0-1,0 0-15,0 0 16,0 0-1,0 0-15,9 29 16,1 13-16,5 17 16,0 15-1,-5 7-15,-1 3 16,1-1-16,-10-4 16,5-5-1,-5-3-15,0-2 16,5-2-16,-5-8 15,0-8 1,0-6-16,0-11 16,0-4-1,0-8-15,0-5 16,0-5-16,0-2 16,0-3-16,0-2 15,0 0 1,0 0-16,0-2 15,0-1 1,0 1-16,0 1 16,0 1-16,5 0 15,-5 3 1,5 2-16,-5-1 16,5 1-16,0 0 15,-5 2 1,0-2-16,0 0 15,0 0-15,0 2 16,-5 0 0,-5 1-16,0 2 15,0 2 1,-4 2-16,-6 4 16,-5 4-16,1 2 15,-6 3 1,-4 0-16,4-2 15,-4-3-15,-6-3 16,1-2 0,0-4-16,-1-4 15,1-4-15,-5-2 16,4-3 0,-4-3-16,-5-2 15,-5-2-15,-10-6 16,-5-4-1,0-3-15,5-5 16,15 1 0,10-1-16,9 0 15,6 1-15,4 2 16,0-3 0,0-2-16</inkml:trace>
   <inkml:trace contextRef="#ctx0" brushRef="#br0" timeOffset="11209.22">7212 15092 0,'0'0'0,"0"0"0,0 0 16,-44 12 0,0 3-16,-15 2 15,-20 5 1,-5-2-16,-14-5 15,4-8-15,11-4 16,4-6 0,10 1-16,5-3 15,5 2 1,15 1-16,14 2 16</inkml:trace>
   <inkml:trace contextRef="#ctx0" brushRef="#br0" timeOffset="11441.96">6528 15296 0,'0'0'15,"0"0"-15,0 0 16,15 49-1,5-2-15,4 15 16,6 9-16,-1 0 16,-4-7-1,5-7-15,-6-3 16,1-2 0</inkml:trace>
   <inkml:trace contextRef="#ctx0" brushRef="#br0" timeOffset="12190.59">6907 15572 0,'0'0'16,"0"0"-16,0 34 15,10 5 1,0 18-16,0 12 16,4 2-1,1-7-15,-5-7 16,-5-13-16,0-14 16,0-11-1,-5-6-15,0-6 16,0-5-16,0-2 15,0-2 1,0-5-16,0 7 16,-5-47-16,5 7 15,-5-6 1,5-4-16,5-1 16,0 2-16,5 2 15,4 8 1,1 7-16,10 4 15,-1 6 1,6 5-16,4 2 16,-9 6-16,-1 4 15,-9 5 1,-5 2-16,-5 3 16,0 5-16,-5 5 15,-5 9 1,-20 16-16,-14 6 15,-5-1-15,-1-9 16,11-8 0,9-9-16,6-4 15,9-3 1,5-4-16,0-1 16,5 0-16,5 1 15,10 2 1,4 2-16,11 5 15,9 0-15,1 1 16,-6-4 0,-4-1-16,-6-4 15,-9-1-15,0-3 16,0-5 0</inkml:trace>
@@ -406,7 +407,7 @@
           <a:p>
             <a:fld id="{762CD6BD-7546-4E5B-AEEF-17BA2030D417}" type="datetimeFigureOut">
               <a:rPr lang="it-IT" smtClean="0"/>
-              <a:t>14/11/2022</a:t>
+              <a:t>25/03/2024</a:t>
             </a:fld>
             <a:endParaRPr lang="it-IT"/>
           </a:p>
@@ -2731,7 +2732,7 @@
                   <a:spcPct val="0"/>
                 </a:spcBef>
               </a:pPr>
-              <a:t>26</a:t>
+              <a:t>27</a:t>
             </a:fld>
             <a:endParaRPr lang="en-AU" altLang="it-IT"/>
           </a:p>
@@ -3007,7 +3008,7 @@
                   <a:spcPct val="0"/>
                 </a:spcBef>
               </a:pPr>
-              <a:t>27</a:t>
+              <a:t>28</a:t>
             </a:fld>
             <a:endParaRPr lang="en-AU" altLang="it-IT"/>
           </a:p>
@@ -3170,7 +3171,7 @@
           <a:p>
             <a:fld id="{DD268F46-A143-4D49-98F9-74B8259B3C7B}" type="datetimeFigureOut">
               <a:rPr lang="it-IT" smtClean="0"/>
-              <a:t>14/11/2022</a:t>
+              <a:t>25/03/2024</a:t>
             </a:fld>
             <a:endParaRPr lang="it-IT"/>
           </a:p>
@@ -3370,7 +3371,7 @@
           <a:p>
             <a:fld id="{DD268F46-A143-4D49-98F9-74B8259B3C7B}" type="datetimeFigureOut">
               <a:rPr lang="it-IT" smtClean="0"/>
-              <a:t>14/11/2022</a:t>
+              <a:t>25/03/2024</a:t>
             </a:fld>
             <a:endParaRPr lang="it-IT"/>
           </a:p>
@@ -3580,7 +3581,7 @@
           <a:p>
             <a:fld id="{DD268F46-A143-4D49-98F9-74B8259B3C7B}" type="datetimeFigureOut">
               <a:rPr lang="it-IT" smtClean="0"/>
-              <a:t>14/11/2022</a:t>
+              <a:t>25/03/2024</a:t>
             </a:fld>
             <a:endParaRPr lang="it-IT"/>
           </a:p>
@@ -3780,7 +3781,7 @@
           <a:p>
             <a:fld id="{DD268F46-A143-4D49-98F9-74B8259B3C7B}" type="datetimeFigureOut">
               <a:rPr lang="it-IT" smtClean="0"/>
-              <a:t>14/11/2022</a:t>
+              <a:t>25/03/2024</a:t>
             </a:fld>
             <a:endParaRPr lang="it-IT"/>
           </a:p>
@@ -4056,7 +4057,7 @@
           <a:p>
             <a:fld id="{DD268F46-A143-4D49-98F9-74B8259B3C7B}" type="datetimeFigureOut">
               <a:rPr lang="it-IT" smtClean="0"/>
-              <a:t>14/11/2022</a:t>
+              <a:t>25/03/2024</a:t>
             </a:fld>
             <a:endParaRPr lang="it-IT"/>
           </a:p>
@@ -4324,7 +4325,7 @@
           <a:p>
             <a:fld id="{DD268F46-A143-4D49-98F9-74B8259B3C7B}" type="datetimeFigureOut">
               <a:rPr lang="it-IT" smtClean="0"/>
-              <a:t>14/11/2022</a:t>
+              <a:t>25/03/2024</a:t>
             </a:fld>
             <a:endParaRPr lang="it-IT"/>
           </a:p>
@@ -4739,7 +4740,7 @@
           <a:p>
             <a:fld id="{DD268F46-A143-4D49-98F9-74B8259B3C7B}" type="datetimeFigureOut">
               <a:rPr lang="it-IT" smtClean="0"/>
-              <a:t>14/11/2022</a:t>
+              <a:t>25/03/2024</a:t>
             </a:fld>
             <a:endParaRPr lang="it-IT"/>
           </a:p>
@@ -4881,7 +4882,7 @@
           <a:p>
             <a:fld id="{DD268F46-A143-4D49-98F9-74B8259B3C7B}" type="datetimeFigureOut">
               <a:rPr lang="it-IT" smtClean="0"/>
-              <a:t>14/11/2022</a:t>
+              <a:t>25/03/2024</a:t>
             </a:fld>
             <a:endParaRPr lang="it-IT"/>
           </a:p>
@@ -4994,7 +4995,7 @@
           <a:p>
             <a:fld id="{DD268F46-A143-4D49-98F9-74B8259B3C7B}" type="datetimeFigureOut">
               <a:rPr lang="it-IT" smtClean="0"/>
-              <a:t>14/11/2022</a:t>
+              <a:t>25/03/2024</a:t>
             </a:fld>
             <a:endParaRPr lang="it-IT"/>
           </a:p>
@@ -5307,7 +5308,7 @@
           <a:p>
             <a:fld id="{DD268F46-A143-4D49-98F9-74B8259B3C7B}" type="datetimeFigureOut">
               <a:rPr lang="it-IT" smtClean="0"/>
-              <a:t>14/11/2022</a:t>
+              <a:t>25/03/2024</a:t>
             </a:fld>
             <a:endParaRPr lang="it-IT"/>
           </a:p>
@@ -5596,7 +5597,7 @@
           <a:p>
             <a:fld id="{DD268F46-A143-4D49-98F9-74B8259B3C7B}" type="datetimeFigureOut">
               <a:rPr lang="it-IT" smtClean="0"/>
-              <a:t>14/11/2022</a:t>
+              <a:t>25/03/2024</a:t>
             </a:fld>
             <a:endParaRPr lang="it-IT"/>
           </a:p>
@@ -5839,7 +5840,7 @@
           <a:p>
             <a:fld id="{DD268F46-A143-4D49-98F9-74B8259B3C7B}" type="datetimeFigureOut">
               <a:rPr lang="it-IT" smtClean="0"/>
-              <a:t>14/11/2022</a:t>
+              <a:t>25/03/2024</a:t>
             </a:fld>
             <a:endParaRPr lang="it-IT"/>
           </a:p>
@@ -8147,6 +8148,36 @@
           <a:chExt cx="0" cy="0"/>
         </a:xfrm>
       </p:grpSpPr>
+    </p:spTree>
+    <p:extLst>
+      <p:ext uri="{BB962C8B-B14F-4D97-AF65-F5344CB8AC3E}">
+        <p14:creationId xmlns:p14="http://schemas.microsoft.com/office/powerpoint/2010/main" val="3520225271"/>
+      </p:ext>
+    </p:extLst>
+  </p:cSld>
+  <p:clrMapOvr>
+    <a:masterClrMapping/>
+  </p:clrMapOvr>
+</p:sld>
+</file>
+
+<file path=ppt/slides/slide19.xml><?xml version="1.0" encoding="utf-8"?>
+<p:sld xmlns:a="http://schemas.openxmlformats.org/drawingml/2006/main" xmlns:r="http://schemas.openxmlformats.org/officeDocument/2006/relationships" xmlns:p="http://schemas.openxmlformats.org/presentationml/2006/main">
+  <p:cSld>
+    <p:spTree>
+      <p:nvGrpSpPr>
+        <p:cNvPr id="1" name=""/>
+        <p:cNvGrpSpPr/>
+        <p:nvPr/>
+      </p:nvGrpSpPr>
+      <p:grpSpPr>
+        <a:xfrm>
+          <a:off x="0" y="0"/>
+          <a:ext cx="0" cy="0"/>
+          <a:chOff x="0" y="0"/>
+          <a:chExt cx="0" cy="0"/>
+        </a:xfrm>
+      </p:grpSpPr>
       <p:sp>
         <p:nvSpPr>
           <p:cNvPr id="2" name="Title 1">
@@ -8240,102 +8271,6 @@
 </p:sld>
 </file>
 
-<file path=ppt/slides/slide19.xml><?xml version="1.0" encoding="utf-8"?>
-<p:sld xmlns:a="http://schemas.openxmlformats.org/drawingml/2006/main" xmlns:r="http://schemas.openxmlformats.org/officeDocument/2006/relationships" xmlns:p="http://schemas.openxmlformats.org/presentationml/2006/main">
-  <p:cSld>
-    <p:spTree>
-      <p:nvGrpSpPr>
-        <p:cNvPr id="1" name=""/>
-        <p:cNvGrpSpPr/>
-        <p:nvPr/>
-      </p:nvGrpSpPr>
-      <p:grpSpPr>
-        <a:xfrm>
-          <a:off x="0" y="0"/>
-          <a:ext cx="0" cy="0"/>
-          <a:chOff x="0" y="0"/>
-          <a:chExt cx="0" cy="0"/>
-        </a:xfrm>
-      </p:grpSpPr>
-      <p:sp>
-        <p:nvSpPr>
-          <p:cNvPr id="2" name="Title 1">
-            <a:extLst>
-              <a:ext uri="{FF2B5EF4-FFF2-40B4-BE49-F238E27FC236}">
-                <a16:creationId xmlns:a16="http://schemas.microsoft.com/office/drawing/2014/main" id="{D63483BF-07BC-421A-AC97-C3FD9B5B4268}"/>
-              </a:ext>
-            </a:extLst>
-          </p:cNvPr>
-          <p:cNvSpPr>
-            <a:spLocks noGrp="1"/>
-          </p:cNvSpPr>
-          <p:nvPr>
-            <p:ph type="title"/>
-          </p:nvPr>
-        </p:nvSpPr>
-        <p:spPr/>
-        <p:txBody>
-          <a:bodyPr/>
-          <a:lstStyle/>
-          <a:p>
-            <a:r>
-              <a:rPr lang="en-US" dirty="0"/>
-              <a:t>Example of CA private key theft</a:t>
-            </a:r>
-            <a:endParaRPr lang="it-IT" dirty="0"/>
-          </a:p>
-        </p:txBody>
-      </p:sp>
-      <p:sp>
-        <p:nvSpPr>
-          <p:cNvPr id="3" name="Content Placeholder 2">
-            <a:extLst>
-              <a:ext uri="{FF2B5EF4-FFF2-40B4-BE49-F238E27FC236}">
-                <a16:creationId xmlns:a16="http://schemas.microsoft.com/office/drawing/2014/main" id="{A0E590FE-E684-467B-8A5E-5DA4F926C81A}"/>
-              </a:ext>
-            </a:extLst>
-          </p:cNvPr>
-          <p:cNvSpPr>
-            <a:spLocks noGrp="1"/>
-          </p:cNvSpPr>
-          <p:nvPr>
-            <p:ph idx="1"/>
-          </p:nvPr>
-        </p:nvSpPr>
-        <p:spPr/>
-        <p:txBody>
-          <a:bodyPr/>
-          <a:lstStyle/>
-          <a:p>
-            <a:r>
-              <a:rPr lang="en-US" dirty="0"/>
-              <a:t>The </a:t>
-            </a:r>
-            <a:r>
-              <a:rPr lang="en-US" dirty="0" err="1"/>
-              <a:t>Diginotar</a:t>
-            </a:r>
-            <a:r>
-              <a:rPr lang="en-US" dirty="0"/>
-              <a:t> case and many more</a:t>
-            </a:r>
-            <a:endParaRPr lang="it-IT" dirty="0"/>
-          </a:p>
-        </p:txBody>
-      </p:sp>
-    </p:spTree>
-    <p:extLst>
-      <p:ext uri="{BB962C8B-B14F-4D97-AF65-F5344CB8AC3E}">
-        <p14:creationId xmlns:p14="http://schemas.microsoft.com/office/powerpoint/2010/main" val="534134575"/>
-      </p:ext>
-    </p:extLst>
-  </p:cSld>
-  <p:clrMapOvr>
-    <a:masterClrMapping/>
-  </p:clrMapOvr>
-</p:sld>
-</file>
-
 <file path=ppt/slides/slide2.xml><?xml version="1.0" encoding="utf-8"?>
 <p:sld xmlns:a="http://schemas.openxmlformats.org/drawingml/2006/main" xmlns:r="http://schemas.openxmlformats.org/officeDocument/2006/relationships" xmlns:p="http://schemas.openxmlformats.org/presentationml/2006/main">
   <p:cSld>
@@ -8406,6 +8341,20 @@
             <a:r>
               <a:rPr lang="en-US" dirty="0"/>
               <a:t>Distributing public keys is subject to MITM</a:t>
+            </a:r>
+          </a:p>
+          <a:p>
+            <a:r>
+              <a:rPr lang="en-US" dirty="0"/>
+              <a:t>Need of a way of having </a:t>
+            </a:r>
+            <a:r>
+              <a:rPr lang="en-US" b="1" dirty="0"/>
+              <a:t>trusted</a:t>
+            </a:r>
+            <a:r>
+              <a:rPr lang="en-US" dirty="0"/>
+              <a:t> public keys</a:t>
             </a:r>
           </a:p>
           <a:p>
@@ -8445,6 +8394,102 @@
       </p:grpSpPr>
       <p:sp>
         <p:nvSpPr>
+          <p:cNvPr id="2" name="Title 1">
+            <a:extLst>
+              <a:ext uri="{FF2B5EF4-FFF2-40B4-BE49-F238E27FC236}">
+                <a16:creationId xmlns:a16="http://schemas.microsoft.com/office/drawing/2014/main" id="{D63483BF-07BC-421A-AC97-C3FD9B5B4268}"/>
+              </a:ext>
+            </a:extLst>
+          </p:cNvPr>
+          <p:cNvSpPr>
+            <a:spLocks noGrp="1"/>
+          </p:cNvSpPr>
+          <p:nvPr>
+            <p:ph type="title"/>
+          </p:nvPr>
+        </p:nvSpPr>
+        <p:spPr/>
+        <p:txBody>
+          <a:bodyPr/>
+          <a:lstStyle/>
+          <a:p>
+            <a:r>
+              <a:rPr lang="en-US" dirty="0"/>
+              <a:t>Example of CA private key theft</a:t>
+            </a:r>
+            <a:endParaRPr lang="it-IT" dirty="0"/>
+          </a:p>
+        </p:txBody>
+      </p:sp>
+      <p:sp>
+        <p:nvSpPr>
+          <p:cNvPr id="3" name="Content Placeholder 2">
+            <a:extLst>
+              <a:ext uri="{FF2B5EF4-FFF2-40B4-BE49-F238E27FC236}">
+                <a16:creationId xmlns:a16="http://schemas.microsoft.com/office/drawing/2014/main" id="{A0E590FE-E684-467B-8A5E-5DA4F926C81A}"/>
+              </a:ext>
+            </a:extLst>
+          </p:cNvPr>
+          <p:cNvSpPr>
+            <a:spLocks noGrp="1"/>
+          </p:cNvSpPr>
+          <p:nvPr>
+            <p:ph idx="1"/>
+          </p:nvPr>
+        </p:nvSpPr>
+        <p:spPr/>
+        <p:txBody>
+          <a:bodyPr/>
+          <a:lstStyle/>
+          <a:p>
+            <a:r>
+              <a:rPr lang="en-US" dirty="0"/>
+              <a:t>The </a:t>
+            </a:r>
+            <a:r>
+              <a:rPr lang="en-US" dirty="0" err="1"/>
+              <a:t>Diginotar</a:t>
+            </a:r>
+            <a:r>
+              <a:rPr lang="en-US" dirty="0"/>
+              <a:t> case and many more</a:t>
+            </a:r>
+            <a:endParaRPr lang="it-IT" dirty="0"/>
+          </a:p>
+        </p:txBody>
+      </p:sp>
+    </p:spTree>
+    <p:extLst>
+      <p:ext uri="{BB962C8B-B14F-4D97-AF65-F5344CB8AC3E}">
+        <p14:creationId xmlns:p14="http://schemas.microsoft.com/office/powerpoint/2010/main" val="534134575"/>
+      </p:ext>
+    </p:extLst>
+  </p:cSld>
+  <p:clrMapOvr>
+    <a:masterClrMapping/>
+  </p:clrMapOvr>
+</p:sld>
+</file>
+
+<file path=ppt/slides/slide21.xml><?xml version="1.0" encoding="utf-8"?>
+<p:sld xmlns:a="http://schemas.openxmlformats.org/drawingml/2006/main" xmlns:r="http://schemas.openxmlformats.org/officeDocument/2006/relationships" xmlns:p="http://schemas.openxmlformats.org/presentationml/2006/main">
+  <p:cSld>
+    <p:spTree>
+      <p:nvGrpSpPr>
+        <p:cNvPr id="1" name=""/>
+        <p:cNvGrpSpPr/>
+        <p:nvPr/>
+      </p:nvGrpSpPr>
+      <p:grpSpPr>
+        <a:xfrm>
+          <a:off x="0" y="0"/>
+          <a:ext cx="0" cy="0"/>
+          <a:chOff x="0" y="0"/>
+          <a:chExt cx="0" cy="0"/>
+        </a:xfrm>
+      </p:grpSpPr>
+      <p:sp>
+        <p:nvSpPr>
           <p:cNvPr id="53250" name="Titolo 1">
             <a:extLst>
               <a:ext uri="{FF2B5EF4-FFF2-40B4-BE49-F238E27FC236}">
@@ -8558,7 +8603,7 @@
 </p:sld>
 </file>
 
-<file path=ppt/slides/slide21.xml><?xml version="1.0" encoding="utf-8"?>
+<file path=ppt/slides/slide22.xml><?xml version="1.0" encoding="utf-8"?>
 <p:sld xmlns:a="http://schemas.openxmlformats.org/drawingml/2006/main" xmlns:r="http://schemas.openxmlformats.org/officeDocument/2006/relationships" xmlns:p="http://schemas.openxmlformats.org/presentationml/2006/main">
   <p:cSld>
     <p:bg>
@@ -9125,287 +9170,6 @@
 </p:sld>
 </file>
 
-<file path=ppt/slides/slide22.xml><?xml version="1.0" encoding="utf-8"?>
-<p:sld xmlns:a="http://schemas.openxmlformats.org/drawingml/2006/main" xmlns:r="http://schemas.openxmlformats.org/officeDocument/2006/relationships" xmlns:p="http://schemas.openxmlformats.org/presentationml/2006/main">
-  <p:cSld>
-    <p:spTree>
-      <p:nvGrpSpPr>
-        <p:cNvPr id="1" name=""/>
-        <p:cNvGrpSpPr/>
-        <p:nvPr/>
-      </p:nvGrpSpPr>
-      <p:grpSpPr>
-        <a:xfrm>
-          <a:off x="0" y="0"/>
-          <a:ext cx="0" cy="0"/>
-          <a:chOff x="0" y="0"/>
-          <a:chExt cx="0" cy="0"/>
-        </a:xfrm>
-      </p:grpSpPr>
-      <p:sp>
-        <p:nvSpPr>
-          <p:cNvPr id="55298" name="Titolo 1">
-            <a:extLst>
-              <a:ext uri="{FF2B5EF4-FFF2-40B4-BE49-F238E27FC236}">
-                <a16:creationId xmlns:a16="http://schemas.microsoft.com/office/drawing/2014/main" id="{00B425F9-28E9-49F1-A242-F513CAE22D64}"/>
-              </a:ext>
-            </a:extLst>
-          </p:cNvPr>
-          <p:cNvSpPr>
-            <a:spLocks noGrp="1"/>
-          </p:cNvSpPr>
-          <p:nvPr>
-            <p:ph type="title"/>
-          </p:nvPr>
-        </p:nvSpPr>
-        <p:spPr/>
-        <p:txBody>
-          <a:bodyPr/>
-          <a:lstStyle/>
-          <a:p>
-            <a:r>
-              <a:rPr lang="it-IT" altLang="it-IT"/>
-              <a:t>Certificate revocation check</a:t>
-            </a:r>
-          </a:p>
-        </p:txBody>
-      </p:sp>
-      <p:sp>
-        <p:nvSpPr>
-          <p:cNvPr id="3" name="Segnaposto contenuto 2">
-            <a:extLst>
-              <a:ext uri="{FF2B5EF4-FFF2-40B4-BE49-F238E27FC236}">
-                <a16:creationId xmlns:a16="http://schemas.microsoft.com/office/drawing/2014/main" id="{52070687-03D4-416A-859A-53F1F7C6CE21}"/>
-              </a:ext>
-            </a:extLst>
-          </p:cNvPr>
-          <p:cNvSpPr>
-            <a:spLocks noGrp="1"/>
-          </p:cNvSpPr>
-          <p:nvPr>
-            <p:ph idx="1"/>
-          </p:nvPr>
-        </p:nvSpPr>
-        <p:spPr/>
-        <p:txBody>
-          <a:bodyPr/>
-          <a:lstStyle/>
-          <a:p>
-            <a:pPr marL="0" indent="0">
-              <a:buNone/>
-              <a:defRPr/>
-            </a:pPr>
-            <a:r>
-              <a:rPr lang="it-IT" dirty="0" err="1"/>
-              <a:t>Alternatives</a:t>
-            </a:r>
-            <a:r>
-              <a:rPr lang="it-IT" dirty="0"/>
-              <a:t>:</a:t>
-            </a:r>
-          </a:p>
-          <a:p>
-            <a:pPr>
-              <a:defRPr/>
-            </a:pPr>
-            <a:r>
-              <a:rPr lang="it-IT" dirty="0"/>
-              <a:t>Via an OCSP server. </a:t>
-            </a:r>
-            <a:r>
-              <a:rPr lang="it-IT" dirty="0" err="1"/>
-              <a:t>It</a:t>
-            </a:r>
-            <a:r>
-              <a:rPr lang="it-IT" dirty="0"/>
-              <a:t> must be </a:t>
-            </a:r>
-            <a:r>
-              <a:rPr lang="it-IT" dirty="0" err="1"/>
-              <a:t>trusted</a:t>
-            </a:r>
-            <a:r>
-              <a:rPr lang="it-IT" dirty="0"/>
-              <a:t> on </a:t>
-            </a:r>
-            <a:r>
-              <a:rPr lang="it-IT" dirty="0" err="1"/>
-              <a:t>its</a:t>
-            </a:r>
-            <a:r>
-              <a:rPr lang="it-IT" dirty="0"/>
-              <a:t> </a:t>
-            </a:r>
-            <a:r>
-              <a:rPr lang="it-IT" dirty="0" err="1"/>
-              <a:t>own</a:t>
-            </a:r>
-            <a:r>
-              <a:rPr lang="it-IT" dirty="0"/>
-              <a:t>. The OCSP URL </a:t>
-            </a:r>
-            <a:r>
-              <a:rPr lang="it-IT" dirty="0" err="1"/>
-              <a:t>is</a:t>
-            </a:r>
-            <a:r>
-              <a:rPr lang="it-IT" dirty="0"/>
-              <a:t> </a:t>
-            </a:r>
-            <a:r>
-              <a:rPr lang="it-IT" dirty="0" err="1"/>
-              <a:t>usually</a:t>
-            </a:r>
-            <a:r>
-              <a:rPr lang="it-IT" dirty="0"/>
-              <a:t> in a certificate </a:t>
-            </a:r>
-            <a:r>
-              <a:rPr lang="it-IT" dirty="0" err="1"/>
-              <a:t>field</a:t>
-            </a:r>
-            <a:endParaRPr lang="it-IT" dirty="0"/>
-          </a:p>
-          <a:p>
-            <a:pPr lvl="1">
-              <a:defRPr/>
-            </a:pPr>
-            <a:r>
-              <a:rPr lang="it-IT" dirty="0"/>
-              <a:t>Performance </a:t>
-            </a:r>
-            <a:r>
-              <a:rPr lang="it-IT" dirty="0" err="1"/>
-              <a:t>problem</a:t>
-            </a:r>
-            <a:r>
-              <a:rPr lang="it-IT" dirty="0"/>
-              <a:t> and an </a:t>
-            </a:r>
-            <a:r>
-              <a:rPr lang="it-IT" dirty="0" err="1"/>
-              <a:t>example</a:t>
-            </a:r>
-            <a:r>
-              <a:rPr lang="it-IT" dirty="0"/>
-              <a:t> of </a:t>
-            </a:r>
-            <a:r>
-              <a:rPr lang="it-IT" dirty="0" err="1"/>
-              <a:t>possible</a:t>
-            </a:r>
-            <a:r>
-              <a:rPr lang="it-IT" dirty="0"/>
-              <a:t> domino </a:t>
-            </a:r>
-            <a:r>
-              <a:rPr lang="it-IT" dirty="0" err="1"/>
-              <a:t>attack</a:t>
-            </a:r>
-            <a:r>
-              <a:rPr lang="it-IT" dirty="0"/>
-              <a:t> </a:t>
-            </a:r>
-          </a:p>
-          <a:p>
-            <a:pPr marL="914400" lvl="2" indent="0">
-              <a:buNone/>
-              <a:defRPr/>
-            </a:pPr>
-            <a:r>
-              <a:rPr lang="it-IT" dirty="0" err="1"/>
-              <a:t>Availability</a:t>
-            </a:r>
-            <a:r>
-              <a:rPr lang="it-IT" dirty="0"/>
-              <a:t> -&gt; </a:t>
-            </a:r>
-            <a:r>
-              <a:rPr lang="it-IT" dirty="0" err="1"/>
-              <a:t>Confidentiality+Integrity</a:t>
-            </a:r>
-            <a:endParaRPr lang="it-IT" dirty="0"/>
-          </a:p>
-          <a:p>
-            <a:pPr>
-              <a:defRPr/>
-            </a:pPr>
-            <a:r>
-              <a:rPr lang="it-IT" dirty="0"/>
-              <a:t>Via download of </a:t>
-            </a:r>
-            <a:r>
-              <a:rPr lang="it-IT" dirty="0" err="1"/>
-              <a:t>huge</a:t>
-            </a:r>
-            <a:r>
-              <a:rPr lang="it-IT" dirty="0"/>
-              <a:t> CRL </a:t>
-            </a:r>
-            <a:r>
-              <a:rPr lang="it-IT" dirty="0" err="1"/>
-              <a:t>txt</a:t>
-            </a:r>
-            <a:r>
-              <a:rPr lang="it-IT" dirty="0"/>
-              <a:t> </a:t>
-            </a:r>
-            <a:r>
-              <a:rPr lang="it-IT" dirty="0" err="1"/>
-              <a:t>files</a:t>
-            </a:r>
-            <a:endParaRPr lang="it-IT" dirty="0"/>
-          </a:p>
-          <a:p>
-            <a:pPr lvl="1">
-              <a:defRPr/>
-            </a:pPr>
-            <a:r>
-              <a:rPr lang="it-IT" dirty="0"/>
-              <a:t>Big performance </a:t>
-            </a:r>
-            <a:r>
-              <a:rPr lang="it-IT" dirty="0" err="1"/>
-              <a:t>problem</a:t>
-            </a:r>
-            <a:endParaRPr lang="it-IT" dirty="0"/>
-          </a:p>
-          <a:p>
-            <a:pPr>
-              <a:defRPr/>
-            </a:pPr>
-            <a:r>
-              <a:rPr lang="it-IT" dirty="0"/>
-              <a:t>OCSP </a:t>
-            </a:r>
-            <a:r>
-              <a:rPr lang="it-IT" dirty="0" err="1"/>
-              <a:t>Stapling</a:t>
-            </a:r>
-            <a:endParaRPr lang="it-IT" dirty="0"/>
-          </a:p>
-          <a:p>
-            <a:pPr lvl="1">
-              <a:defRPr/>
-            </a:pPr>
-            <a:endParaRPr lang="it-IT" dirty="0"/>
-          </a:p>
-          <a:p>
-            <a:pPr>
-              <a:defRPr/>
-            </a:pPr>
-            <a:endParaRPr lang="it-IT" dirty="0"/>
-          </a:p>
-        </p:txBody>
-      </p:sp>
-    </p:spTree>
-  </p:cSld>
-  <p:clrMapOvr>
-    <a:masterClrMapping/>
-  </p:clrMapOvr>
-</p:sld>
-</file>
-
 <file path=ppt/slides/slide23.xml><?xml version="1.0" encoding="utf-8"?>
 <p:sld xmlns:a="http://schemas.openxmlformats.org/drawingml/2006/main" xmlns:r="http://schemas.openxmlformats.org/officeDocument/2006/relationships" xmlns:p="http://schemas.openxmlformats.org/presentationml/2006/main">
   <p:cSld>
@@ -9425,10 +9189,10 @@
       </p:grpSpPr>
       <p:sp>
         <p:nvSpPr>
-          <p:cNvPr id="56322" name="Titolo 1">
-            <a:extLst>
-              <a:ext uri="{FF2B5EF4-FFF2-40B4-BE49-F238E27FC236}">
-                <a16:creationId xmlns:a16="http://schemas.microsoft.com/office/drawing/2014/main" id="{D9696B3E-3921-478B-80E0-BB2F6F636A51}"/>
+          <p:cNvPr id="55298" name="Titolo 1">
+            <a:extLst>
+              <a:ext uri="{FF2B5EF4-FFF2-40B4-BE49-F238E27FC236}">
+                <a16:creationId xmlns:a16="http://schemas.microsoft.com/office/drawing/2014/main" id="{00B425F9-28E9-49F1-A242-F513CAE22D64}"/>
               </a:ext>
             </a:extLst>
           </p:cNvPr>
@@ -9446,17 +9210,17 @@
           <a:p>
             <a:r>
               <a:rPr lang="it-IT" altLang="it-IT"/>
-              <a:t>Usage of public keys in certificate</a:t>
-            </a:r>
-          </a:p>
-        </p:txBody>
-      </p:sp>
-      <p:sp>
-        <p:nvSpPr>
-          <p:cNvPr id="56323" name="Segnaposto contenuto 2">
-            <a:extLst>
-              <a:ext uri="{FF2B5EF4-FFF2-40B4-BE49-F238E27FC236}">
-                <a16:creationId xmlns:a16="http://schemas.microsoft.com/office/drawing/2014/main" id="{CB3E4D5B-1822-453E-9818-BACED1D4366B}"/>
+              <a:t>Certificate revocation check</a:t>
+            </a:r>
+          </a:p>
+        </p:txBody>
+      </p:sp>
+      <p:sp>
+        <p:nvSpPr>
+          <p:cNvPr id="3" name="Segnaposto contenuto 2">
+            <a:extLst>
+              <a:ext uri="{FF2B5EF4-FFF2-40B4-BE49-F238E27FC236}">
+                <a16:creationId xmlns:a16="http://schemas.microsoft.com/office/drawing/2014/main" id="{52070687-03D4-416A-859A-53F1F7C6CE21}"/>
               </a:ext>
             </a:extLst>
           </p:cNvPr>
@@ -9472,37 +9236,210 @@
           <a:bodyPr/>
           <a:lstStyle/>
           <a:p>
-            <a:r>
-              <a:rPr lang="it-IT" altLang="it-IT"/>
-              <a:t>BasicConstraints:</a:t>
-            </a:r>
-          </a:p>
-          <a:p>
-            <a:pPr lvl="1"/>
-            <a:r>
-              <a:rPr lang="it-IT" altLang="it-IT"/>
-              <a:t>CA true or false, pathlen</a:t>
-            </a:r>
-          </a:p>
-          <a:p>
-            <a:r>
-              <a:rPr lang="it-IT" altLang="it-IT"/>
-              <a:t>KeyUsage values:</a:t>
-            </a:r>
-          </a:p>
-          <a:p>
-            <a:pPr lvl="1"/>
-            <a:r>
-              <a:rPr lang="it-IT" altLang="it-IT" sz="2000"/>
-              <a:t>digitalSignature, nonRepudiation, keyEncipherment, dataEncipherment, keyAgreement, keyCertSign, cRLSign, encipherOnly and decipherOnly</a:t>
-            </a:r>
-          </a:p>
-          <a:p>
-            <a:endParaRPr lang="it-IT" altLang="it-IT" sz="2400"/>
-          </a:p>
-          <a:p>
-            <a:pPr lvl="1"/>
-            <a:endParaRPr lang="it-IT" altLang="it-IT"/>
+            <a:pPr marL="0" indent="0">
+              <a:buNone/>
+              <a:defRPr/>
+            </a:pPr>
+            <a:r>
+              <a:rPr lang="it-IT" dirty="0" err="1"/>
+              <a:t>Alternatives</a:t>
+            </a:r>
+            <a:r>
+              <a:rPr lang="it-IT" dirty="0"/>
+              <a:t>:</a:t>
+            </a:r>
+          </a:p>
+          <a:p>
+            <a:pPr>
+              <a:defRPr/>
+            </a:pPr>
+            <a:r>
+              <a:rPr lang="it-IT" dirty="0"/>
+              <a:t>Via an OCSP server. </a:t>
+            </a:r>
+            <a:r>
+              <a:rPr lang="it-IT" dirty="0" err="1"/>
+              <a:t>It</a:t>
+            </a:r>
+            <a:r>
+              <a:rPr lang="it-IT" dirty="0"/>
+              <a:t> must be </a:t>
+            </a:r>
+            <a:r>
+              <a:rPr lang="it-IT" dirty="0" err="1"/>
+              <a:t>trusted</a:t>
+            </a:r>
+            <a:r>
+              <a:rPr lang="it-IT" dirty="0"/>
+              <a:t> on </a:t>
+            </a:r>
+            <a:r>
+              <a:rPr lang="it-IT" dirty="0" err="1"/>
+              <a:t>its</a:t>
+            </a:r>
+            <a:r>
+              <a:rPr lang="it-IT" dirty="0"/>
+              <a:t> </a:t>
+            </a:r>
+            <a:r>
+              <a:rPr lang="it-IT" dirty="0" err="1"/>
+              <a:t>own</a:t>
+            </a:r>
+            <a:r>
+              <a:rPr lang="it-IT" dirty="0"/>
+              <a:t>. The OCSP URL </a:t>
+            </a:r>
+            <a:r>
+              <a:rPr lang="it-IT" dirty="0" err="1"/>
+              <a:t>is</a:t>
+            </a:r>
+            <a:r>
+              <a:rPr lang="it-IT" dirty="0"/>
+              <a:t> </a:t>
+            </a:r>
+            <a:r>
+              <a:rPr lang="it-IT" dirty="0" err="1"/>
+              <a:t>usually</a:t>
+            </a:r>
+            <a:r>
+              <a:rPr lang="it-IT" dirty="0"/>
+              <a:t> in a certificate </a:t>
+            </a:r>
+            <a:r>
+              <a:rPr lang="it-IT" dirty="0" err="1"/>
+              <a:t>field</a:t>
+            </a:r>
+            <a:endParaRPr lang="it-IT" dirty="0"/>
+          </a:p>
+          <a:p>
+            <a:pPr lvl="1">
+              <a:defRPr/>
+            </a:pPr>
+            <a:r>
+              <a:rPr lang="it-IT" dirty="0"/>
+              <a:t>Performance </a:t>
+            </a:r>
+            <a:r>
+              <a:rPr lang="it-IT" dirty="0" err="1"/>
+              <a:t>problem</a:t>
+            </a:r>
+            <a:r>
+              <a:rPr lang="it-IT" dirty="0"/>
+              <a:t> and an </a:t>
+            </a:r>
+            <a:r>
+              <a:rPr lang="it-IT" dirty="0" err="1"/>
+              <a:t>example</a:t>
+            </a:r>
+            <a:r>
+              <a:rPr lang="it-IT" dirty="0"/>
+              <a:t> of </a:t>
+            </a:r>
+            <a:r>
+              <a:rPr lang="it-IT" dirty="0" err="1"/>
+              <a:t>possible</a:t>
+            </a:r>
+            <a:r>
+              <a:rPr lang="it-IT" dirty="0"/>
+              <a:t> domino </a:t>
+            </a:r>
+            <a:r>
+              <a:rPr lang="it-IT" dirty="0" err="1"/>
+              <a:t>attack</a:t>
+            </a:r>
+            <a:r>
+              <a:rPr lang="it-IT" dirty="0"/>
+              <a:t> </a:t>
+            </a:r>
+          </a:p>
+          <a:p>
+            <a:pPr marL="914400" lvl="2" indent="0">
+              <a:buNone/>
+              <a:defRPr/>
+            </a:pPr>
+            <a:r>
+              <a:rPr lang="it-IT" dirty="0" err="1"/>
+              <a:t>Availability</a:t>
+            </a:r>
+            <a:r>
+              <a:rPr lang="it-IT" dirty="0"/>
+              <a:t> -&gt; </a:t>
+            </a:r>
+            <a:r>
+              <a:rPr lang="it-IT" dirty="0" err="1"/>
+              <a:t>Confidentiality+Integrity</a:t>
+            </a:r>
+            <a:endParaRPr lang="it-IT" dirty="0"/>
+          </a:p>
+          <a:p>
+            <a:pPr>
+              <a:defRPr/>
+            </a:pPr>
+            <a:r>
+              <a:rPr lang="it-IT" dirty="0"/>
+              <a:t>Via download of </a:t>
+            </a:r>
+            <a:r>
+              <a:rPr lang="it-IT" dirty="0" err="1"/>
+              <a:t>huge</a:t>
+            </a:r>
+            <a:r>
+              <a:rPr lang="it-IT" dirty="0"/>
+              <a:t> CRL </a:t>
+            </a:r>
+            <a:r>
+              <a:rPr lang="it-IT" dirty="0" err="1"/>
+              <a:t>txt</a:t>
+            </a:r>
+            <a:r>
+              <a:rPr lang="it-IT" dirty="0"/>
+              <a:t> </a:t>
+            </a:r>
+            <a:r>
+              <a:rPr lang="it-IT" dirty="0" err="1"/>
+              <a:t>files</a:t>
+            </a:r>
+            <a:endParaRPr lang="it-IT" dirty="0"/>
+          </a:p>
+          <a:p>
+            <a:pPr lvl="1">
+              <a:defRPr/>
+            </a:pPr>
+            <a:r>
+              <a:rPr lang="it-IT" dirty="0"/>
+              <a:t>Big performance </a:t>
+            </a:r>
+            <a:r>
+              <a:rPr lang="it-IT" dirty="0" err="1"/>
+              <a:t>problem</a:t>
+            </a:r>
+            <a:endParaRPr lang="it-IT" dirty="0"/>
+          </a:p>
+          <a:p>
+            <a:pPr>
+              <a:defRPr/>
+            </a:pPr>
+            <a:r>
+              <a:rPr lang="it-IT" dirty="0"/>
+              <a:t>OCSP </a:t>
+            </a:r>
+            <a:r>
+              <a:rPr lang="it-IT" dirty="0" err="1"/>
+              <a:t>Stapling</a:t>
+            </a:r>
+            <a:endParaRPr lang="it-IT" dirty="0"/>
+          </a:p>
+          <a:p>
+            <a:pPr lvl="1">
+              <a:defRPr/>
+            </a:pPr>
+            <a:endParaRPr lang="it-IT" dirty="0"/>
+          </a:p>
+          <a:p>
+            <a:pPr>
+              <a:defRPr/>
+            </a:pPr>
+            <a:endParaRPr lang="it-IT" dirty="0"/>
           </a:p>
         </p:txBody>
       </p:sp>
@@ -9533,10 +9470,10 @@
       </p:grpSpPr>
       <p:sp>
         <p:nvSpPr>
-          <p:cNvPr id="2" name="Title 1">
-            <a:extLst>
-              <a:ext uri="{FF2B5EF4-FFF2-40B4-BE49-F238E27FC236}">
-                <a16:creationId xmlns:a16="http://schemas.microsoft.com/office/drawing/2014/main" id="{9C867D60-A375-49EA-9B9B-66966548488F}"/>
+          <p:cNvPr id="56322" name="Titolo 1">
+            <a:extLst>
+              <a:ext uri="{FF2B5EF4-FFF2-40B4-BE49-F238E27FC236}">
+                <a16:creationId xmlns:a16="http://schemas.microsoft.com/office/drawing/2014/main" id="{D9696B3E-3921-478B-80E0-BB2F6F636A51}"/>
               </a:ext>
             </a:extLst>
           </p:cNvPr>
@@ -9553,19 +9490,18 @@
           <a:lstStyle/>
           <a:p>
             <a:r>
-              <a:rPr lang="en-US" dirty="0"/>
-              <a:t>Other known PKIs – Usages	</a:t>
-            </a:r>
-            <a:endParaRPr lang="it-IT" dirty="0"/>
-          </a:p>
-        </p:txBody>
-      </p:sp>
-      <p:sp>
-        <p:nvSpPr>
-          <p:cNvPr id="3" name="Content Placeholder 2">
-            <a:extLst>
-              <a:ext uri="{FF2B5EF4-FFF2-40B4-BE49-F238E27FC236}">
-                <a16:creationId xmlns:a16="http://schemas.microsoft.com/office/drawing/2014/main" id="{033B3825-AEB2-43F6-A04F-DA779948FFD4}"/>
+              <a:rPr lang="it-IT" altLang="it-IT"/>
+              <a:t>Usage of public keys in certificate</a:t>
+            </a:r>
+          </a:p>
+        </p:txBody>
+      </p:sp>
+      <p:sp>
+        <p:nvSpPr>
+          <p:cNvPr id="56323" name="Segnaposto contenuto 2">
+            <a:extLst>
+              <a:ext uri="{FF2B5EF4-FFF2-40B4-BE49-F238E27FC236}">
+                <a16:creationId xmlns:a16="http://schemas.microsoft.com/office/drawing/2014/main" id="{CB3E4D5B-1822-453E-9818-BACED1D4366B}"/>
               </a:ext>
             </a:extLst>
           </p:cNvPr>
@@ -9582,31 +9518,40 @@
           <a:lstStyle/>
           <a:p>
             <a:r>
-              <a:rPr lang="en-US" dirty="0"/>
-              <a:t>Code signing</a:t>
-            </a:r>
-          </a:p>
-          <a:p>
-            <a:r>
-              <a:rPr lang="en-US" dirty="0"/>
-              <a:t>Public administration</a:t>
-            </a:r>
-          </a:p>
-          <a:p>
-            <a:r>
-              <a:rPr lang="en-US" dirty="0"/>
-              <a:t>Digital Rights Management</a:t>
-            </a:r>
-            <a:endParaRPr lang="it-IT" dirty="0"/>
+              <a:rPr lang="it-IT" altLang="it-IT"/>
+              <a:t>BasicConstraints:</a:t>
+            </a:r>
+          </a:p>
+          <a:p>
+            <a:pPr lvl="1"/>
+            <a:r>
+              <a:rPr lang="it-IT" altLang="it-IT"/>
+              <a:t>CA true or false, pathlen</a:t>
+            </a:r>
+          </a:p>
+          <a:p>
+            <a:r>
+              <a:rPr lang="it-IT" altLang="it-IT"/>
+              <a:t>KeyUsage values:</a:t>
+            </a:r>
+          </a:p>
+          <a:p>
+            <a:pPr lvl="1"/>
+            <a:r>
+              <a:rPr lang="it-IT" altLang="it-IT" sz="2000"/>
+              <a:t>digitalSignature, nonRepudiation, keyEncipherment, dataEncipherment, keyAgreement, keyCertSign, cRLSign, encipherOnly and decipherOnly</a:t>
+            </a:r>
+          </a:p>
+          <a:p>
+            <a:endParaRPr lang="it-IT" altLang="it-IT" sz="2400"/>
+          </a:p>
+          <a:p>
+            <a:pPr lvl="1"/>
+            <a:endParaRPr lang="it-IT" altLang="it-IT"/>
           </a:p>
         </p:txBody>
       </p:sp>
     </p:spTree>
-    <p:extLst>
-      <p:ext uri="{BB962C8B-B14F-4D97-AF65-F5344CB8AC3E}">
-        <p14:creationId xmlns:p14="http://schemas.microsoft.com/office/powerpoint/2010/main" val="1678698923"/>
-      </p:ext>
-    </p:extLst>
   </p:cSld>
   <p:clrMapOvr>
     <a:masterClrMapping/>
@@ -9633,10 +9578,10 @@
       </p:grpSpPr>
       <p:sp>
         <p:nvSpPr>
-          <p:cNvPr id="57346" name="Titolo 1">
-            <a:extLst>
-              <a:ext uri="{FF2B5EF4-FFF2-40B4-BE49-F238E27FC236}">
-                <a16:creationId xmlns:a16="http://schemas.microsoft.com/office/drawing/2014/main" id="{397BC71E-38D7-4B04-86CF-D378199F21D6}"/>
+          <p:cNvPr id="2" name="Title 1">
+            <a:extLst>
+              <a:ext uri="{FF2B5EF4-FFF2-40B4-BE49-F238E27FC236}">
+                <a16:creationId xmlns:a16="http://schemas.microsoft.com/office/drawing/2014/main" id="{9C867D60-A375-49EA-9B9B-66966548488F}"/>
               </a:ext>
             </a:extLst>
           </p:cNvPr>
@@ -9653,18 +9598,19 @@
           <a:lstStyle/>
           <a:p>
             <a:r>
-              <a:rPr lang="it-IT" altLang="it-IT"/>
-              <a:t>Extended key usages</a:t>
-            </a:r>
-          </a:p>
-        </p:txBody>
-      </p:sp>
-      <p:sp>
-        <p:nvSpPr>
-          <p:cNvPr id="57347" name="Segnaposto contenuto 2">
-            <a:extLst>
-              <a:ext uri="{FF2B5EF4-FFF2-40B4-BE49-F238E27FC236}">
-                <a16:creationId xmlns:a16="http://schemas.microsoft.com/office/drawing/2014/main" id="{F2B8323A-AF25-43B3-9807-A30CC415C73F}"/>
+              <a:rPr lang="en-US" dirty="0"/>
+              <a:t>Other known PKIs – Usages	</a:t>
+            </a:r>
+            <a:endParaRPr lang="it-IT" dirty="0"/>
+          </a:p>
+        </p:txBody>
+      </p:sp>
+      <p:sp>
+        <p:nvSpPr>
+          <p:cNvPr id="3" name="Content Placeholder 2">
+            <a:extLst>
+              <a:ext uri="{FF2B5EF4-FFF2-40B4-BE49-F238E27FC236}">
+                <a16:creationId xmlns:a16="http://schemas.microsoft.com/office/drawing/2014/main" id="{033B3825-AEB2-43F6-A04F-DA779948FFD4}"/>
               </a:ext>
             </a:extLst>
           </p:cNvPr>
@@ -9677,130 +9623,35 @@
         </p:nvSpPr>
         <p:spPr/>
         <p:txBody>
-          <a:bodyPr>
-            <a:normAutofit lnSpcReduction="10000"/>
-          </a:bodyPr>
+          <a:bodyPr/>
           <a:lstStyle/>
           <a:p>
             <a:r>
-              <a:rPr lang="it-IT" altLang="it-IT" sz="1600">
-                <a:latin typeface="Courier New" panose="02070309020205020404" pitchFamily="49" charset="0"/>
-                <a:cs typeface="Courier New" panose="02070309020205020404" pitchFamily="49" charset="0"/>
-              </a:rPr>
-              <a:t>Value                  Meaning</a:t>
-            </a:r>
-          </a:p>
-          <a:p>
-            <a:r>
-              <a:rPr lang="it-IT" altLang="it-IT" sz="1600">
-                <a:latin typeface="Courier New" panose="02070309020205020404" pitchFamily="49" charset="0"/>
-                <a:cs typeface="Courier New" panose="02070309020205020404" pitchFamily="49" charset="0"/>
-              </a:rPr>
-              <a:t> -----                  -------</a:t>
-            </a:r>
-          </a:p>
-          <a:p>
-            <a:r>
-              <a:rPr lang="it-IT" altLang="it-IT" sz="1600">
-                <a:latin typeface="Courier New" panose="02070309020205020404" pitchFamily="49" charset="0"/>
-                <a:cs typeface="Courier New" panose="02070309020205020404" pitchFamily="49" charset="0"/>
-              </a:rPr>
-              <a:t> serverAuth             SSL/TLS Web Server Authentication.</a:t>
-            </a:r>
-          </a:p>
-          <a:p>
-            <a:r>
-              <a:rPr lang="it-IT" altLang="it-IT" sz="1600">
-                <a:latin typeface="Courier New" panose="02070309020205020404" pitchFamily="49" charset="0"/>
-                <a:cs typeface="Courier New" panose="02070309020205020404" pitchFamily="49" charset="0"/>
-              </a:rPr>
-              <a:t> clientAuth             SSL/TLS Web Client Authentication.</a:t>
-            </a:r>
-          </a:p>
-          <a:p>
-            <a:r>
-              <a:rPr lang="it-IT" altLang="it-IT" sz="1600">
-                <a:latin typeface="Courier New" panose="02070309020205020404" pitchFamily="49" charset="0"/>
-                <a:cs typeface="Courier New" panose="02070309020205020404" pitchFamily="49" charset="0"/>
-              </a:rPr>
-              <a:t> codeSigning            Code signing.</a:t>
-            </a:r>
-          </a:p>
-          <a:p>
-            <a:r>
-              <a:rPr lang="it-IT" altLang="it-IT" sz="1600">
-                <a:latin typeface="Courier New" panose="02070309020205020404" pitchFamily="49" charset="0"/>
-                <a:cs typeface="Courier New" panose="02070309020205020404" pitchFamily="49" charset="0"/>
-              </a:rPr>
-              <a:t> emailProtection        E-mail Protection (S/MIME).</a:t>
-            </a:r>
-          </a:p>
-          <a:p>
-            <a:r>
-              <a:rPr lang="it-IT" altLang="it-IT" sz="1600">
-                <a:latin typeface="Courier New" panose="02070309020205020404" pitchFamily="49" charset="0"/>
-                <a:cs typeface="Courier New" panose="02070309020205020404" pitchFamily="49" charset="0"/>
-              </a:rPr>
-              <a:t> timeStamping           Trusted Timestamping</a:t>
-            </a:r>
-          </a:p>
-          <a:p>
-            <a:r>
-              <a:rPr lang="it-IT" altLang="it-IT" sz="1600">
-                <a:latin typeface="Courier New" panose="02070309020205020404" pitchFamily="49" charset="0"/>
-                <a:cs typeface="Courier New" panose="02070309020205020404" pitchFamily="49" charset="0"/>
-              </a:rPr>
-              <a:t> OCSPSigning            OCSP Signing</a:t>
-            </a:r>
-          </a:p>
-          <a:p>
-            <a:r>
-              <a:rPr lang="it-IT" altLang="it-IT" sz="1600">
-                <a:latin typeface="Courier New" panose="02070309020205020404" pitchFamily="49" charset="0"/>
-                <a:cs typeface="Courier New" panose="02070309020205020404" pitchFamily="49" charset="0"/>
-              </a:rPr>
-              <a:t> ipsecIKE               ipsec Internet Key Exchange</a:t>
-            </a:r>
-          </a:p>
-          <a:p>
-            <a:r>
-              <a:rPr lang="it-IT" altLang="it-IT" sz="1600">
-                <a:latin typeface="Courier New" panose="02070309020205020404" pitchFamily="49" charset="0"/>
-                <a:cs typeface="Courier New" panose="02070309020205020404" pitchFamily="49" charset="0"/>
-              </a:rPr>
-              <a:t> msCodeInd              Microsoft Individual Code Signing (authenticode)</a:t>
-            </a:r>
-          </a:p>
-          <a:p>
-            <a:r>
-              <a:rPr lang="it-IT" altLang="it-IT" sz="1600">
-                <a:latin typeface="Courier New" panose="02070309020205020404" pitchFamily="49" charset="0"/>
-                <a:cs typeface="Courier New" panose="02070309020205020404" pitchFamily="49" charset="0"/>
-              </a:rPr>
-              <a:t> msCodeCom              Microsoft Commercial Code Signing (authenticode)</a:t>
-            </a:r>
-          </a:p>
-          <a:p>
-            <a:r>
-              <a:rPr lang="it-IT" altLang="it-IT" sz="1600">
-                <a:latin typeface="Courier New" panose="02070309020205020404" pitchFamily="49" charset="0"/>
-                <a:cs typeface="Courier New" panose="02070309020205020404" pitchFamily="49" charset="0"/>
-              </a:rPr>
-              <a:t> msCTLSign              Microsoft Trust List Signing</a:t>
-            </a:r>
-          </a:p>
-          <a:p>
-            <a:r>
-              <a:rPr lang="it-IT" altLang="it-IT" sz="1600">
-                <a:latin typeface="Courier New" panose="02070309020205020404" pitchFamily="49" charset="0"/>
-                <a:cs typeface="Courier New" panose="02070309020205020404" pitchFamily="49" charset="0"/>
-              </a:rPr>
-              <a:t> msEFS                  Microsoft Encrypted File System</a:t>
-            </a:r>
+              <a:rPr lang="en-US" dirty="0"/>
+              <a:t>Code signing</a:t>
+            </a:r>
+          </a:p>
+          <a:p>
+            <a:r>
+              <a:rPr lang="en-US" dirty="0"/>
+              <a:t>Public administration</a:t>
+            </a:r>
+          </a:p>
+          <a:p>
+            <a:r>
+              <a:rPr lang="en-US" dirty="0"/>
+              <a:t>Digital Rights Management</a:t>
+            </a:r>
+            <a:endParaRPr lang="it-IT" dirty="0"/>
           </a:p>
         </p:txBody>
       </p:sp>
     </p:spTree>
+    <p:extLst>
+      <p:ext uri="{BB962C8B-B14F-4D97-AF65-F5344CB8AC3E}">
+        <p14:creationId xmlns:p14="http://schemas.microsoft.com/office/powerpoint/2010/main" val="1678698923"/>
+      </p:ext>
+    </p:extLst>
   </p:cSld>
   <p:clrMapOvr>
     <a:masterClrMapping/>
@@ -9827,10 +9678,10 @@
       </p:grpSpPr>
       <p:sp>
         <p:nvSpPr>
-          <p:cNvPr id="82946" name="Titolo 1">
-            <a:extLst>
-              <a:ext uri="{FF2B5EF4-FFF2-40B4-BE49-F238E27FC236}">
-                <a16:creationId xmlns:a16="http://schemas.microsoft.com/office/drawing/2014/main" id="{854CAB9A-452E-4344-8F6C-CB6FDF99A009}"/>
+          <p:cNvPr id="57346" name="Titolo 1">
+            <a:extLst>
+              <a:ext uri="{FF2B5EF4-FFF2-40B4-BE49-F238E27FC236}">
+                <a16:creationId xmlns:a16="http://schemas.microsoft.com/office/drawing/2014/main" id="{397BC71E-38D7-4B04-86CF-D378199F21D6}"/>
               </a:ext>
             </a:extLst>
           </p:cNvPr>
@@ -9846,99 +9697,19 @@
           <a:bodyPr/>
           <a:lstStyle/>
           <a:p>
-            <a:pPr eaLnBrk="1" hangingPunct="1"/>
-            <a:r>
-              <a:rPr lang="it-IT" altLang="it-IT" dirty="0">
-                <a:ea typeface="MS PGothic" panose="020B0600070205080204" pitchFamily="34" charset="-128"/>
-              </a:rPr>
-              <a:t>PKI </a:t>
-            </a:r>
-            <a:r>
-              <a:rPr lang="it-IT" altLang="it-IT" dirty="0" err="1">
-                <a:ea typeface="MS PGothic" panose="020B0600070205080204" pitchFamily="34" charset="-128"/>
-              </a:rPr>
-              <a:t>Assumptions</a:t>
-            </a:r>
-            <a:r>
-              <a:rPr lang="it-IT" altLang="it-IT" dirty="0">
-                <a:ea typeface="MS PGothic" panose="020B0600070205080204" pitchFamily="34" charset="-128"/>
-              </a:rPr>
-              <a:t> and </a:t>
-            </a:r>
-            <a:r>
-              <a:rPr lang="it-IT" altLang="it-IT" dirty="0" err="1">
-                <a:ea typeface="MS PGothic" panose="020B0600070205080204" pitchFamily="34" charset="-128"/>
-              </a:rPr>
-              <a:t>its</a:t>
-            </a:r>
-            <a:r>
-              <a:rPr lang="it-IT" altLang="it-IT" dirty="0">
-                <a:ea typeface="MS PGothic" panose="020B0600070205080204" pitchFamily="34" charset="-128"/>
-              </a:rPr>
-              <a:t> </a:t>
-            </a:r>
-            <a:r>
-              <a:rPr lang="it-IT" altLang="it-IT" dirty="0" err="1">
-                <a:ea typeface="MS PGothic" panose="020B0600070205080204" pitchFamily="34" charset="-128"/>
-              </a:rPr>
-              <a:t>attack</a:t>
-            </a:r>
-            <a:r>
-              <a:rPr lang="it-IT" altLang="it-IT" dirty="0">
-                <a:ea typeface="MS PGothic" panose="020B0600070205080204" pitchFamily="34" charset="-128"/>
-              </a:rPr>
-              <a:t> </a:t>
-            </a:r>
-            <a:r>
-              <a:rPr lang="it-IT" altLang="it-IT" dirty="0" err="1">
-                <a:ea typeface="MS PGothic" panose="020B0600070205080204" pitchFamily="34" charset="-128"/>
-              </a:rPr>
-              <a:t>surface</a:t>
-            </a:r>
-            <a:br>
-              <a:rPr lang="it-IT" altLang="it-IT" dirty="0">
-                <a:ea typeface="MS PGothic" panose="020B0600070205080204" pitchFamily="34" charset="-128"/>
-              </a:rPr>
-            </a:br>
-            <a:r>
-              <a:rPr lang="it-IT" altLang="it-IT" sz="2400" dirty="0">
-                <a:ea typeface="MS PGothic" panose="020B0600070205080204" pitchFamily="34" charset="-128"/>
-              </a:rPr>
-              <a:t>from </a:t>
-            </a:r>
-            <a:r>
-              <a:rPr lang="it-IT" altLang="it-IT" sz="2400" dirty="0">
-                <a:ea typeface="MS PGothic" panose="020B0600070205080204" pitchFamily="34" charset="-128"/>
-                <a:hlinkClick r:id="rId3"/>
-              </a:rPr>
-              <a:t>«</a:t>
-            </a:r>
-            <a:r>
-              <a:rPr lang="it-IT" altLang="it-IT" sz="2400" dirty="0" err="1">
-                <a:ea typeface="MS PGothic" panose="020B0600070205080204" pitchFamily="34" charset="-128"/>
-                <a:hlinkClick r:id="rId3"/>
-              </a:rPr>
-              <a:t>ten</a:t>
-            </a:r>
-            <a:r>
-              <a:rPr lang="it-IT" altLang="it-IT" sz="2400" dirty="0">
-                <a:ea typeface="MS PGothic" panose="020B0600070205080204" pitchFamily="34" charset="-128"/>
-                <a:hlinkClick r:id="rId3"/>
-              </a:rPr>
-              <a:t> risks of PKI»</a:t>
-            </a:r>
-            <a:endParaRPr lang="it-IT" altLang="it-IT" sz="2400" dirty="0">
-              <a:ea typeface="MS PGothic" panose="020B0600070205080204" pitchFamily="34" charset="-128"/>
-            </a:endParaRPr>
-          </a:p>
-        </p:txBody>
-      </p:sp>
-      <p:sp>
-        <p:nvSpPr>
-          <p:cNvPr id="45059" name="Segnaposto contenuto 2">
-            <a:extLst>
-              <a:ext uri="{FF2B5EF4-FFF2-40B4-BE49-F238E27FC236}">
-                <a16:creationId xmlns:a16="http://schemas.microsoft.com/office/drawing/2014/main" id="{6B9E76DD-15A2-4268-A2E3-C6F6C1057875}"/>
+            <a:r>
+              <a:rPr lang="it-IT" altLang="it-IT"/>
+              <a:t>Extended key usages</a:t>
+            </a:r>
+          </a:p>
+        </p:txBody>
+      </p:sp>
+      <p:sp>
+        <p:nvSpPr>
+          <p:cNvPr id="57347" name="Segnaposto contenuto 2">
+            <a:extLst>
+              <a:ext uri="{FF2B5EF4-FFF2-40B4-BE49-F238E27FC236}">
+                <a16:creationId xmlns:a16="http://schemas.microsoft.com/office/drawing/2014/main" id="{F2B8323A-AF25-43B3-9807-A30CC415C73F}"/>
               </a:ext>
             </a:extLst>
           </p:cNvPr>
@@ -9951,419 +9722,125 @@
         </p:nvSpPr>
         <p:spPr/>
         <p:txBody>
-          <a:bodyPr rtlCol="0">
-            <a:normAutofit/>
+          <a:bodyPr>
+            <a:normAutofit lnSpcReduction="10000"/>
           </a:bodyPr>
           <a:lstStyle/>
           <a:p>
-            <a:pPr marL="514350" indent="-514350">
-              <a:buFont typeface="Franklin Gothic Medium" pitchFamily="34" charset="0"/>
-              <a:buAutoNum type="arabicPeriod"/>
-              <a:defRPr/>
-            </a:pPr>
-            <a:r>
-              <a:rPr lang="it-IT" altLang="it-IT" dirty="0">
-                <a:ea typeface="ＭＳ Ｐゴシック" pitchFamily="34" charset="-128"/>
-              </a:rPr>
-              <a:t>Trust </a:t>
-            </a:r>
-            <a:r>
-              <a:rPr lang="it-IT" altLang="it-IT" dirty="0" err="1">
-                <a:ea typeface="ＭＳ Ｐゴシック" pitchFamily="34" charset="-128"/>
-              </a:rPr>
-              <a:t>your</a:t>
-            </a:r>
-            <a:r>
-              <a:rPr lang="it-IT" altLang="it-IT" dirty="0">
-                <a:ea typeface="ＭＳ Ｐゴシック" pitchFamily="34" charset="-128"/>
-              </a:rPr>
-              <a:t> CA and </a:t>
-            </a:r>
-            <a:r>
-              <a:rPr lang="it-IT" altLang="it-IT" dirty="0" err="1">
-                <a:ea typeface="ＭＳ Ｐゴシック" pitchFamily="34" charset="-128"/>
-              </a:rPr>
-              <a:t>its</a:t>
-            </a:r>
-            <a:r>
-              <a:rPr lang="it-IT" altLang="it-IT" dirty="0">
-                <a:ea typeface="ＭＳ Ｐゴシック" pitchFamily="34" charset="-128"/>
-              </a:rPr>
-              <a:t> CPS (Certificate </a:t>
-            </a:r>
-            <a:r>
-              <a:rPr lang="it-IT" altLang="it-IT" dirty="0" err="1">
-                <a:ea typeface="ＭＳ Ｐゴシック" pitchFamily="34" charset="-128"/>
-              </a:rPr>
-              <a:t>Practice</a:t>
-            </a:r>
-            <a:r>
-              <a:rPr lang="it-IT" altLang="it-IT" dirty="0">
-                <a:ea typeface="ＭＳ Ｐゴシック" pitchFamily="34" charset="-128"/>
-              </a:rPr>
-              <a:t> Statement)</a:t>
-            </a:r>
-          </a:p>
-          <a:p>
-            <a:pPr marL="514350" indent="-514350">
-              <a:buFont typeface="Franklin Gothic Medium" pitchFamily="34" charset="0"/>
-              <a:buAutoNum type="arabicPeriod"/>
-              <a:defRPr/>
-            </a:pPr>
-            <a:r>
-              <a:rPr lang="it-IT" altLang="it-IT" dirty="0">
-                <a:ea typeface="ＭＳ Ｐゴシック" pitchFamily="34" charset="-128"/>
-              </a:rPr>
-              <a:t>Trust </a:t>
-            </a:r>
-            <a:r>
-              <a:rPr lang="it-IT" altLang="it-IT" dirty="0" err="1">
-                <a:ea typeface="ＭＳ Ｐゴシック" pitchFamily="34" charset="-128"/>
-              </a:rPr>
-              <a:t>that</a:t>
-            </a:r>
-            <a:r>
-              <a:rPr lang="it-IT" altLang="it-IT" dirty="0">
-                <a:ea typeface="ＭＳ Ｐゴシック" pitchFamily="34" charset="-128"/>
-              </a:rPr>
-              <a:t> a private </a:t>
-            </a:r>
-            <a:r>
-              <a:rPr lang="it-IT" altLang="it-IT" dirty="0" err="1">
-                <a:ea typeface="ＭＳ Ｐゴシック" pitchFamily="34" charset="-128"/>
-              </a:rPr>
-              <a:t>key</a:t>
-            </a:r>
-            <a:r>
-              <a:rPr lang="it-IT" altLang="it-IT" dirty="0">
-                <a:ea typeface="ＭＳ Ｐゴシック" pitchFamily="34" charset="-128"/>
-              </a:rPr>
-              <a:t> </a:t>
-            </a:r>
-            <a:r>
-              <a:rPr lang="it-IT" altLang="it-IT" dirty="0" err="1">
-                <a:ea typeface="ＭＳ Ｐゴシック" pitchFamily="34" charset="-128"/>
-              </a:rPr>
-              <a:t>will</a:t>
-            </a:r>
-            <a:r>
-              <a:rPr lang="it-IT" altLang="it-IT" dirty="0">
-                <a:ea typeface="ＭＳ Ｐゴシック" pitchFamily="34" charset="-128"/>
-              </a:rPr>
-              <a:t> be </a:t>
-            </a:r>
-            <a:r>
-              <a:rPr lang="it-IT" altLang="it-IT" dirty="0" err="1">
-                <a:ea typeface="ＭＳ Ｐゴシック" pitchFamily="34" charset="-128"/>
-              </a:rPr>
-              <a:t>handled</a:t>
-            </a:r>
-            <a:r>
-              <a:rPr lang="it-IT" altLang="it-IT" dirty="0">
-                <a:ea typeface="ＭＳ Ｐゴシック" pitchFamily="34" charset="-128"/>
-              </a:rPr>
-              <a:t> </a:t>
-            </a:r>
-            <a:r>
-              <a:rPr lang="it-IT" altLang="it-IT" dirty="0" err="1">
-                <a:ea typeface="ＭＳ Ｐゴシック" pitchFamily="34" charset="-128"/>
-              </a:rPr>
-              <a:t>only</a:t>
-            </a:r>
-            <a:r>
-              <a:rPr lang="it-IT" altLang="it-IT" dirty="0">
-                <a:ea typeface="ＭＳ Ｐゴシック" pitchFamily="34" charset="-128"/>
-              </a:rPr>
-              <a:t> by the </a:t>
-            </a:r>
-            <a:r>
-              <a:rPr lang="it-IT" altLang="it-IT" dirty="0" err="1">
-                <a:ea typeface="ＭＳ Ｐゴシック" pitchFamily="34" charset="-128"/>
-              </a:rPr>
-              <a:t>legitimate</a:t>
-            </a:r>
-            <a:r>
-              <a:rPr lang="it-IT" altLang="it-IT" dirty="0">
-                <a:ea typeface="ＭＳ Ｐゴシック" pitchFamily="34" charset="-128"/>
-              </a:rPr>
-              <a:t> </a:t>
-            </a:r>
-            <a:r>
-              <a:rPr lang="it-IT" altLang="it-IT" dirty="0" err="1">
-                <a:ea typeface="ＭＳ Ｐゴシック" pitchFamily="34" charset="-128"/>
-              </a:rPr>
-              <a:t>handler</a:t>
-            </a:r>
-            <a:r>
-              <a:rPr lang="it-IT" altLang="it-IT" dirty="0">
-                <a:ea typeface="ＭＳ Ｐゴシック" pitchFamily="34" charset="-128"/>
-              </a:rPr>
-              <a:t> (</a:t>
-            </a:r>
-            <a:r>
-              <a:rPr lang="it-IT" altLang="it-IT" dirty="0" err="1">
-                <a:ea typeface="ＭＳ Ｐゴシック" pitchFamily="34" charset="-128"/>
-              </a:rPr>
-              <a:t>legal</a:t>
-            </a:r>
-            <a:r>
-              <a:rPr lang="it-IT" altLang="it-IT" dirty="0">
-                <a:ea typeface="ＭＳ Ｐゴシック" pitchFamily="34" charset="-128"/>
-              </a:rPr>
-              <a:t> </a:t>
-            </a:r>
-            <a:r>
-              <a:rPr lang="it-IT" altLang="it-IT" dirty="0" err="1">
-                <a:ea typeface="ＭＳ Ｐゴシック" pitchFamily="34" charset="-128"/>
-              </a:rPr>
-              <a:t>assumptions</a:t>
-            </a:r>
-            <a:r>
-              <a:rPr lang="it-IT" altLang="it-IT" dirty="0">
-                <a:ea typeface="ＭＳ Ｐゴシック" pitchFamily="34" charset="-128"/>
-              </a:rPr>
-              <a:t>)</a:t>
-            </a:r>
-          </a:p>
-          <a:p>
-            <a:pPr marL="514350" indent="-514350">
-              <a:buFont typeface="Franklin Gothic Medium" pitchFamily="34" charset="0"/>
-              <a:buAutoNum type="arabicPeriod"/>
-              <a:defRPr/>
-            </a:pPr>
-            <a:r>
-              <a:rPr lang="it-IT" altLang="it-IT" dirty="0">
-                <a:ea typeface="ＭＳ Ｐゴシック" pitchFamily="34" charset="-128"/>
-              </a:rPr>
-              <a:t>Trust the </a:t>
-            </a:r>
-            <a:r>
-              <a:rPr lang="it-IT" altLang="it-IT" dirty="0" err="1">
-                <a:ea typeface="ＭＳ Ｐゴシック" pitchFamily="34" charset="-128"/>
-              </a:rPr>
-              <a:t>verifying</a:t>
-            </a:r>
-            <a:r>
-              <a:rPr lang="it-IT" altLang="it-IT" dirty="0">
-                <a:ea typeface="ＭＳ Ｐゴシック" pitchFamily="34" charset="-128"/>
-              </a:rPr>
-              <a:t> computer/browser and </a:t>
-            </a:r>
-            <a:r>
-              <a:rPr lang="it-IT" altLang="it-IT" dirty="0" err="1">
-                <a:ea typeface="ＭＳ Ｐゴシック" pitchFamily="34" charset="-128"/>
-              </a:rPr>
-              <a:t>its</a:t>
-            </a:r>
-            <a:r>
-              <a:rPr lang="it-IT" altLang="it-IT" dirty="0">
-                <a:ea typeface="ＭＳ Ｐゴシック" pitchFamily="34" charset="-128"/>
-              </a:rPr>
-              <a:t> </a:t>
-            </a:r>
-            <a:r>
-              <a:rPr lang="it-IT" altLang="it-IT" dirty="0" err="1">
-                <a:ea typeface="ＭＳ Ｐゴシック" pitchFamily="34" charset="-128"/>
-              </a:rPr>
-              <a:t>own</a:t>
-            </a:r>
-            <a:r>
-              <a:rPr lang="it-IT" altLang="it-IT" dirty="0">
-                <a:ea typeface="ＭＳ Ｐゴシック" pitchFamily="34" charset="-128"/>
-              </a:rPr>
-              <a:t> root certificate list</a:t>
-            </a:r>
-          </a:p>
-          <a:p>
-            <a:pPr marL="514350" indent="-514350">
-              <a:buFont typeface="Franklin Gothic Medium" pitchFamily="34" charset="0"/>
-              <a:buAutoNum type="arabicPeriod"/>
-              <a:defRPr/>
-            </a:pPr>
-            <a:r>
-              <a:rPr lang="it-IT" altLang="it-IT" sz="2800" dirty="0">
-                <a:ea typeface="ＭＳ Ｐゴシック" pitchFamily="34" charset="-128"/>
-              </a:rPr>
-              <a:t>The CA </a:t>
-            </a:r>
-            <a:r>
-              <a:rPr lang="it-IT" altLang="it-IT" sz="2800" dirty="0" err="1">
-                <a:ea typeface="ＭＳ Ｐゴシック" pitchFamily="34" charset="-128"/>
-              </a:rPr>
-              <a:t>trusted</a:t>
-            </a:r>
-            <a:r>
-              <a:rPr lang="it-IT" altLang="it-IT" sz="2800" dirty="0">
-                <a:ea typeface="ＭＳ Ｐゴシック" pitchFamily="34" charset="-128"/>
-              </a:rPr>
-              <a:t> list </a:t>
-            </a:r>
-            <a:r>
-              <a:rPr lang="it-IT" altLang="it-IT" sz="2800" dirty="0" err="1">
-                <a:ea typeface="ＭＳ Ｐゴシック" pitchFamily="34" charset="-128"/>
-              </a:rPr>
-              <a:t>is</a:t>
-            </a:r>
-            <a:r>
-              <a:rPr lang="it-IT" altLang="it-IT" sz="2800" dirty="0">
-                <a:ea typeface="ＭＳ Ｐゴシック" pitchFamily="34" charset="-128"/>
-              </a:rPr>
-              <a:t> </a:t>
-            </a:r>
-            <a:r>
-              <a:rPr lang="it-IT" altLang="it-IT" sz="2800" dirty="0" err="1">
-                <a:ea typeface="ＭＳ Ｐゴシック" pitchFamily="34" charset="-128"/>
-              </a:rPr>
-              <a:t>as</a:t>
-            </a:r>
-            <a:r>
-              <a:rPr lang="it-IT" altLang="it-IT" sz="2800" dirty="0">
-                <a:ea typeface="ＭＳ Ｐゴシック" pitchFamily="34" charset="-128"/>
-              </a:rPr>
-              <a:t> </a:t>
-            </a:r>
-            <a:r>
-              <a:rPr lang="it-IT" altLang="it-IT" sz="2800" dirty="0" err="1">
-                <a:ea typeface="ＭＳ Ｐゴシック" pitchFamily="34" charset="-128"/>
-              </a:rPr>
-              <a:t>weak</a:t>
-            </a:r>
-            <a:r>
-              <a:rPr lang="it-IT" altLang="it-IT" sz="2800" dirty="0">
-                <a:ea typeface="ＭＳ Ｐゴシック" pitchFamily="34" charset="-128"/>
-              </a:rPr>
-              <a:t> </a:t>
-            </a:r>
-            <a:r>
-              <a:rPr lang="it-IT" altLang="it-IT" sz="2800" dirty="0" err="1">
-                <a:ea typeface="ＭＳ Ｐゴシック" pitchFamily="34" charset="-128"/>
-              </a:rPr>
-              <a:t>as</a:t>
-            </a:r>
-            <a:r>
-              <a:rPr lang="it-IT" altLang="it-IT" sz="2800" dirty="0">
-                <a:ea typeface="ＭＳ Ｐゴシック" pitchFamily="34" charset="-128"/>
-              </a:rPr>
-              <a:t> the </a:t>
-            </a:r>
-            <a:r>
-              <a:rPr lang="it-IT" altLang="it-IT" sz="2800" dirty="0" err="1">
-                <a:ea typeface="ＭＳ Ｐゴシック" pitchFamily="34" charset="-128"/>
-              </a:rPr>
-              <a:t>weakest</a:t>
-            </a:r>
-            <a:r>
-              <a:rPr lang="it-IT" altLang="it-IT" sz="2800" dirty="0">
-                <a:ea typeface="ＭＳ Ｐゴシック" pitchFamily="34" charset="-128"/>
-              </a:rPr>
-              <a:t> CA in the </a:t>
-            </a:r>
-            <a:r>
-              <a:rPr lang="it-IT" altLang="it-IT" sz="2800" dirty="0" err="1">
-                <a:ea typeface="ＭＳ Ｐゴシック" pitchFamily="34" charset="-128"/>
-              </a:rPr>
-              <a:t>bunch</a:t>
-            </a:r>
-            <a:endParaRPr lang="it-IT" altLang="it-IT" dirty="0">
-              <a:ea typeface="ＭＳ Ｐゴシック" pitchFamily="34" charset="-128"/>
-            </a:endParaRPr>
-          </a:p>
-          <a:p>
-            <a:pPr marL="514350" indent="-514350">
-              <a:buFont typeface="Franklin Gothic Medium" pitchFamily="34" charset="0"/>
-              <a:buAutoNum type="arabicPeriod"/>
-              <a:defRPr/>
-            </a:pPr>
-            <a:r>
-              <a:rPr lang="it-IT" altLang="it-IT" dirty="0">
-                <a:ea typeface="ＭＳ Ｐゴシック" pitchFamily="34" charset="-128"/>
-              </a:rPr>
-              <a:t>Trust the </a:t>
-            </a:r>
-            <a:r>
-              <a:rPr lang="it-IT" altLang="it-IT" dirty="0" err="1">
-                <a:ea typeface="ＭＳ Ｐゴシック" pitchFamily="34" charset="-128"/>
-              </a:rPr>
-              <a:t>association</a:t>
-            </a:r>
-            <a:r>
-              <a:rPr lang="it-IT" altLang="it-IT" dirty="0">
-                <a:ea typeface="ＭＳ Ｐゴシック" pitchFamily="34" charset="-128"/>
-              </a:rPr>
-              <a:t> </a:t>
-            </a:r>
-            <a:r>
-              <a:rPr lang="it-IT" altLang="it-IT" dirty="0" err="1">
-                <a:ea typeface="ＭＳ Ｐゴシック" pitchFamily="34" charset="-128"/>
-              </a:rPr>
-              <a:t>between</a:t>
-            </a:r>
-            <a:r>
-              <a:rPr lang="it-IT" altLang="it-IT" dirty="0">
-                <a:ea typeface="ＭＳ Ｐゴシック" pitchFamily="34" charset="-128"/>
-              </a:rPr>
-              <a:t> </a:t>
-            </a:r>
-          </a:p>
-          <a:p>
-            <a:pPr marL="0" indent="0">
-              <a:buNone/>
-              <a:defRPr/>
-            </a:pPr>
-            <a:r>
-              <a:rPr lang="it-IT" altLang="it-IT" dirty="0">
-                <a:ea typeface="ＭＳ Ｐゴシック" pitchFamily="34" charset="-128"/>
-              </a:rPr>
-              <a:t>	Identity</a:t>
-            </a:r>
-            <a:r>
-              <a:rPr lang="it-IT" altLang="it-IT" dirty="0">
-                <a:ea typeface="ＭＳ Ｐゴシック" pitchFamily="34" charset="-128"/>
-                <a:sym typeface="Wingdings" pitchFamily="2" charset="2"/>
-              </a:rPr>
-              <a:t>  </a:t>
-            </a:r>
-            <a:r>
-              <a:rPr lang="it-IT" altLang="it-IT" dirty="0">
-                <a:ea typeface="ＭＳ Ｐゴシック" pitchFamily="34" charset="-128"/>
-              </a:rPr>
-              <a:t>Certificate </a:t>
-            </a:r>
-          </a:p>
-          <a:p>
-            <a:pPr marL="0" indent="0">
-              <a:buNone/>
-              <a:defRPr/>
-            </a:pPr>
-            <a:r>
-              <a:rPr lang="it-IT" altLang="it-IT" dirty="0">
-                <a:ea typeface="ＭＳ Ｐゴシック" pitchFamily="34" charset="-128"/>
-              </a:rPr>
-              <a:t>	(</a:t>
-            </a:r>
-            <a:r>
-              <a:rPr lang="it-IT" altLang="it-IT" dirty="0" err="1">
-                <a:ea typeface="ＭＳ Ｐゴシック" pitchFamily="34" charset="-128"/>
-              </a:rPr>
-              <a:t>homonymies</a:t>
-            </a:r>
-            <a:r>
-              <a:rPr lang="it-IT" altLang="it-IT" dirty="0">
-                <a:ea typeface="ＭＳ Ｐゴシック" pitchFamily="34" charset="-128"/>
-              </a:rPr>
-              <a:t> are </a:t>
-            </a:r>
-            <a:r>
-              <a:rPr lang="it-IT" altLang="it-IT" dirty="0" err="1">
-                <a:ea typeface="ＭＳ Ｐゴシック" pitchFamily="34" charset="-128"/>
-              </a:rPr>
-              <a:t>possible</a:t>
-            </a:r>
-            <a:r>
-              <a:rPr lang="it-IT" altLang="it-IT" dirty="0">
-                <a:ea typeface="ＭＳ Ｐゴシック" pitchFamily="34" charset="-128"/>
-              </a:rPr>
-              <a:t>)</a:t>
+            <a:r>
+              <a:rPr lang="it-IT" altLang="it-IT" sz="1600">
+                <a:latin typeface="Courier New" panose="02070309020205020404" pitchFamily="49" charset="0"/>
+                <a:cs typeface="Courier New" panose="02070309020205020404" pitchFamily="49" charset="0"/>
+              </a:rPr>
+              <a:t>Value                  Meaning</a:t>
+            </a:r>
+          </a:p>
+          <a:p>
+            <a:r>
+              <a:rPr lang="it-IT" altLang="it-IT" sz="1600">
+                <a:latin typeface="Courier New" panose="02070309020205020404" pitchFamily="49" charset="0"/>
+                <a:cs typeface="Courier New" panose="02070309020205020404" pitchFamily="49" charset="0"/>
+              </a:rPr>
+              <a:t> -----                  -------</a:t>
+            </a:r>
+          </a:p>
+          <a:p>
+            <a:r>
+              <a:rPr lang="it-IT" altLang="it-IT" sz="1600">
+                <a:latin typeface="Courier New" panose="02070309020205020404" pitchFamily="49" charset="0"/>
+                <a:cs typeface="Courier New" panose="02070309020205020404" pitchFamily="49" charset="0"/>
+              </a:rPr>
+              <a:t> serverAuth             SSL/TLS Web Server Authentication.</a:t>
+            </a:r>
+          </a:p>
+          <a:p>
+            <a:r>
+              <a:rPr lang="it-IT" altLang="it-IT" sz="1600">
+                <a:latin typeface="Courier New" panose="02070309020205020404" pitchFamily="49" charset="0"/>
+                <a:cs typeface="Courier New" panose="02070309020205020404" pitchFamily="49" charset="0"/>
+              </a:rPr>
+              <a:t> clientAuth             SSL/TLS Web Client Authentication.</a:t>
+            </a:r>
+          </a:p>
+          <a:p>
+            <a:r>
+              <a:rPr lang="it-IT" altLang="it-IT" sz="1600">
+                <a:latin typeface="Courier New" panose="02070309020205020404" pitchFamily="49" charset="0"/>
+                <a:cs typeface="Courier New" panose="02070309020205020404" pitchFamily="49" charset="0"/>
+              </a:rPr>
+              <a:t> codeSigning            Code signing.</a:t>
+            </a:r>
+          </a:p>
+          <a:p>
+            <a:r>
+              <a:rPr lang="it-IT" altLang="it-IT" sz="1600">
+                <a:latin typeface="Courier New" panose="02070309020205020404" pitchFamily="49" charset="0"/>
+                <a:cs typeface="Courier New" panose="02070309020205020404" pitchFamily="49" charset="0"/>
+              </a:rPr>
+              <a:t> emailProtection        E-mail Protection (S/MIME).</a:t>
+            </a:r>
+          </a:p>
+          <a:p>
+            <a:r>
+              <a:rPr lang="it-IT" altLang="it-IT" sz="1600">
+                <a:latin typeface="Courier New" panose="02070309020205020404" pitchFamily="49" charset="0"/>
+                <a:cs typeface="Courier New" panose="02070309020205020404" pitchFamily="49" charset="0"/>
+              </a:rPr>
+              <a:t> timeStamping           Trusted Timestamping</a:t>
+            </a:r>
+          </a:p>
+          <a:p>
+            <a:r>
+              <a:rPr lang="it-IT" altLang="it-IT" sz="1600">
+                <a:latin typeface="Courier New" panose="02070309020205020404" pitchFamily="49" charset="0"/>
+                <a:cs typeface="Courier New" panose="02070309020205020404" pitchFamily="49" charset="0"/>
+              </a:rPr>
+              <a:t> OCSPSigning            OCSP Signing</a:t>
+            </a:r>
+          </a:p>
+          <a:p>
+            <a:r>
+              <a:rPr lang="it-IT" altLang="it-IT" sz="1600">
+                <a:latin typeface="Courier New" panose="02070309020205020404" pitchFamily="49" charset="0"/>
+                <a:cs typeface="Courier New" panose="02070309020205020404" pitchFamily="49" charset="0"/>
+              </a:rPr>
+              <a:t> ipsecIKE               ipsec Internet Key Exchange</a:t>
+            </a:r>
+          </a:p>
+          <a:p>
+            <a:r>
+              <a:rPr lang="it-IT" altLang="it-IT" sz="1600">
+                <a:latin typeface="Courier New" panose="02070309020205020404" pitchFamily="49" charset="0"/>
+                <a:cs typeface="Courier New" panose="02070309020205020404" pitchFamily="49" charset="0"/>
+              </a:rPr>
+              <a:t> msCodeInd              Microsoft Individual Code Signing (authenticode)</a:t>
+            </a:r>
+          </a:p>
+          <a:p>
+            <a:r>
+              <a:rPr lang="it-IT" altLang="it-IT" sz="1600">
+                <a:latin typeface="Courier New" panose="02070309020205020404" pitchFamily="49" charset="0"/>
+                <a:cs typeface="Courier New" panose="02070309020205020404" pitchFamily="49" charset="0"/>
+              </a:rPr>
+              <a:t> msCodeCom              Microsoft Commercial Code Signing (authenticode)</a:t>
+            </a:r>
+          </a:p>
+          <a:p>
+            <a:r>
+              <a:rPr lang="it-IT" altLang="it-IT" sz="1600">
+                <a:latin typeface="Courier New" panose="02070309020205020404" pitchFamily="49" charset="0"/>
+                <a:cs typeface="Courier New" panose="02070309020205020404" pitchFamily="49" charset="0"/>
+              </a:rPr>
+              <a:t> msCTLSign              Microsoft Trust List Signing</a:t>
+            </a:r>
+          </a:p>
+          <a:p>
+            <a:r>
+              <a:rPr lang="it-IT" altLang="it-IT" sz="1600">
+                <a:latin typeface="Courier New" panose="02070309020205020404" pitchFamily="49" charset="0"/>
+                <a:cs typeface="Courier New" panose="02070309020205020404" pitchFamily="49" charset="0"/>
+              </a:rPr>
+              <a:t> msEFS                  Microsoft Encrypted File System</a:t>
             </a:r>
           </a:p>
         </p:txBody>
@@ -10395,10 +9872,10 @@
       </p:grpSpPr>
       <p:sp>
         <p:nvSpPr>
-          <p:cNvPr id="84994" name="Titolo 1">
-            <a:extLst>
-              <a:ext uri="{FF2B5EF4-FFF2-40B4-BE49-F238E27FC236}">
-                <a16:creationId xmlns:a16="http://schemas.microsoft.com/office/drawing/2014/main" id="{AD88CBA9-D587-4A5A-91E0-D6DA5200B6B4}"/>
+          <p:cNvPr id="82946" name="Titolo 1">
+            <a:extLst>
+              <a:ext uri="{FF2B5EF4-FFF2-40B4-BE49-F238E27FC236}">
+                <a16:creationId xmlns:a16="http://schemas.microsoft.com/office/drawing/2014/main" id="{854CAB9A-452E-4344-8F6C-CB6FDF99A009}"/>
               </a:ext>
             </a:extLst>
           </p:cNvPr>
@@ -10416,20 +9893,97 @@
           <a:p>
             <a:pPr eaLnBrk="1" hangingPunct="1"/>
             <a:r>
-              <a:rPr lang="it-IT" altLang="it-IT">
+              <a:rPr lang="it-IT" altLang="it-IT" dirty="0">
                 <a:ea typeface="MS PGothic" panose="020B0600070205080204" pitchFamily="34" charset="-128"/>
               </a:rPr>
-              <a:t>PKI Assumptions #2</a:t>
-            </a:r>
-          </a:p>
-        </p:txBody>
-      </p:sp>
-      <p:sp>
-        <p:nvSpPr>
-          <p:cNvPr id="3" name="Segnaposto contenuto 2">
-            <a:extLst>
-              <a:ext uri="{FF2B5EF4-FFF2-40B4-BE49-F238E27FC236}">
-                <a16:creationId xmlns:a16="http://schemas.microsoft.com/office/drawing/2014/main" id="{14D4D58E-F411-4F7C-8768-20F3523A814E}"/>
+              <a:t>PKI </a:t>
+            </a:r>
+            <a:r>
+              <a:rPr lang="it-IT" altLang="it-IT" dirty="0" err="1">
+                <a:ea typeface="MS PGothic" panose="020B0600070205080204" pitchFamily="34" charset="-128"/>
+              </a:rPr>
+              <a:t>Assumptions</a:t>
+            </a:r>
+            <a:r>
+              <a:rPr lang="it-IT" altLang="it-IT" dirty="0">
+                <a:ea typeface="MS PGothic" panose="020B0600070205080204" pitchFamily="34" charset="-128"/>
+              </a:rPr>
+              <a:t> and </a:t>
+            </a:r>
+            <a:r>
+              <a:rPr lang="it-IT" altLang="it-IT" dirty="0" err="1">
+                <a:ea typeface="MS PGothic" panose="020B0600070205080204" pitchFamily="34" charset="-128"/>
+              </a:rPr>
+              <a:t>its</a:t>
+            </a:r>
+            <a:r>
+              <a:rPr lang="it-IT" altLang="it-IT" dirty="0">
+                <a:ea typeface="MS PGothic" panose="020B0600070205080204" pitchFamily="34" charset="-128"/>
+              </a:rPr>
+              <a:t> </a:t>
+            </a:r>
+            <a:r>
+              <a:rPr lang="it-IT" altLang="it-IT" dirty="0" err="1">
+                <a:ea typeface="MS PGothic" panose="020B0600070205080204" pitchFamily="34" charset="-128"/>
+              </a:rPr>
+              <a:t>attack</a:t>
+            </a:r>
+            <a:r>
+              <a:rPr lang="it-IT" altLang="it-IT" dirty="0">
+                <a:ea typeface="MS PGothic" panose="020B0600070205080204" pitchFamily="34" charset="-128"/>
+              </a:rPr>
+              <a:t> </a:t>
+            </a:r>
+            <a:r>
+              <a:rPr lang="it-IT" altLang="it-IT" dirty="0" err="1">
+                <a:ea typeface="MS PGothic" panose="020B0600070205080204" pitchFamily="34" charset="-128"/>
+              </a:rPr>
+              <a:t>surface</a:t>
+            </a:r>
+            <a:br>
+              <a:rPr lang="it-IT" altLang="it-IT" dirty="0">
+                <a:ea typeface="MS PGothic" panose="020B0600070205080204" pitchFamily="34" charset="-128"/>
+              </a:rPr>
+            </a:br>
+            <a:r>
+              <a:rPr lang="it-IT" altLang="it-IT" sz="2400" dirty="0">
+                <a:ea typeface="MS PGothic" panose="020B0600070205080204" pitchFamily="34" charset="-128"/>
+              </a:rPr>
+              <a:t>from </a:t>
+            </a:r>
+            <a:r>
+              <a:rPr lang="it-IT" altLang="it-IT" sz="2400" dirty="0">
+                <a:ea typeface="MS PGothic" panose="020B0600070205080204" pitchFamily="34" charset="-128"/>
+                <a:hlinkClick r:id="rId3"/>
+              </a:rPr>
+              <a:t>«</a:t>
+            </a:r>
+            <a:r>
+              <a:rPr lang="it-IT" altLang="it-IT" sz="2400" dirty="0" err="1">
+                <a:ea typeface="MS PGothic" panose="020B0600070205080204" pitchFamily="34" charset="-128"/>
+                <a:hlinkClick r:id="rId3"/>
+              </a:rPr>
+              <a:t>ten</a:t>
+            </a:r>
+            <a:r>
+              <a:rPr lang="it-IT" altLang="it-IT" sz="2400" dirty="0">
+                <a:ea typeface="MS PGothic" panose="020B0600070205080204" pitchFamily="34" charset="-128"/>
+                <a:hlinkClick r:id="rId3"/>
+              </a:rPr>
+              <a:t> risks of PKI»</a:t>
+            </a:r>
+            <a:endParaRPr lang="it-IT" altLang="it-IT" sz="2400" dirty="0">
+              <a:ea typeface="MS PGothic" panose="020B0600070205080204" pitchFamily="34" charset="-128"/>
+            </a:endParaRPr>
+          </a:p>
+        </p:txBody>
+      </p:sp>
+      <p:sp>
+        <p:nvSpPr>
+          <p:cNvPr id="45059" name="Segnaposto contenuto 2">
+            <a:extLst>
+              <a:ext uri="{FF2B5EF4-FFF2-40B4-BE49-F238E27FC236}">
+                <a16:creationId xmlns:a16="http://schemas.microsoft.com/office/drawing/2014/main" id="{6B9E76DD-15A2-4268-A2E3-C6F6C1057875}"/>
               </a:ext>
             </a:extLst>
           </p:cNvPr>
@@ -10447,75 +10001,378 @@
           </a:bodyPr>
           <a:lstStyle/>
           <a:p>
+            <a:pPr marL="514350" indent="-514350">
+              <a:buFont typeface="Franklin Gothic Medium" pitchFamily="34" charset="0"/>
+              <a:buAutoNum type="arabicPeriod"/>
+              <a:defRPr/>
+            </a:pPr>
+            <a:r>
+              <a:rPr lang="it-IT" altLang="it-IT" dirty="0">
+                <a:ea typeface="ＭＳ Ｐゴシック" pitchFamily="34" charset="-128"/>
+              </a:rPr>
+              <a:t>Trust </a:t>
+            </a:r>
+            <a:r>
+              <a:rPr lang="it-IT" altLang="it-IT" dirty="0" err="1">
+                <a:ea typeface="ＭＳ Ｐゴシック" pitchFamily="34" charset="-128"/>
+              </a:rPr>
+              <a:t>your</a:t>
+            </a:r>
+            <a:r>
+              <a:rPr lang="it-IT" altLang="it-IT" dirty="0">
+                <a:ea typeface="ＭＳ Ｐゴシック" pitchFamily="34" charset="-128"/>
+              </a:rPr>
+              <a:t> CA and </a:t>
+            </a:r>
+            <a:r>
+              <a:rPr lang="it-IT" altLang="it-IT" dirty="0" err="1">
+                <a:ea typeface="ＭＳ Ｐゴシック" pitchFamily="34" charset="-128"/>
+              </a:rPr>
+              <a:t>its</a:t>
+            </a:r>
+            <a:r>
+              <a:rPr lang="it-IT" altLang="it-IT" dirty="0">
+                <a:ea typeface="ＭＳ Ｐゴシック" pitchFamily="34" charset="-128"/>
+              </a:rPr>
+              <a:t> CPS (Certificate </a:t>
+            </a:r>
+            <a:r>
+              <a:rPr lang="it-IT" altLang="it-IT" dirty="0" err="1">
+                <a:ea typeface="ＭＳ Ｐゴシック" pitchFamily="34" charset="-128"/>
+              </a:rPr>
+              <a:t>Practice</a:t>
+            </a:r>
+            <a:r>
+              <a:rPr lang="it-IT" altLang="it-IT" dirty="0">
+                <a:ea typeface="ＭＳ Ｐゴシック" pitchFamily="34" charset="-128"/>
+              </a:rPr>
+              <a:t> Statement)</a:t>
+            </a:r>
+          </a:p>
+          <a:p>
+            <a:pPr marL="514350" indent="-514350">
+              <a:buFont typeface="Franklin Gothic Medium" pitchFamily="34" charset="0"/>
+              <a:buAutoNum type="arabicPeriod"/>
+              <a:defRPr/>
+            </a:pPr>
+            <a:r>
+              <a:rPr lang="it-IT" altLang="it-IT" dirty="0">
+                <a:ea typeface="ＭＳ Ｐゴシック" pitchFamily="34" charset="-128"/>
+              </a:rPr>
+              <a:t>Trust </a:t>
+            </a:r>
+            <a:r>
+              <a:rPr lang="it-IT" altLang="it-IT" dirty="0" err="1">
+                <a:ea typeface="ＭＳ Ｐゴシック" pitchFamily="34" charset="-128"/>
+              </a:rPr>
+              <a:t>that</a:t>
+            </a:r>
+            <a:r>
+              <a:rPr lang="it-IT" altLang="it-IT" dirty="0">
+                <a:ea typeface="ＭＳ Ｐゴシック" pitchFamily="34" charset="-128"/>
+              </a:rPr>
+              <a:t> a private </a:t>
+            </a:r>
+            <a:r>
+              <a:rPr lang="it-IT" altLang="it-IT" dirty="0" err="1">
+                <a:ea typeface="ＭＳ Ｐゴシック" pitchFamily="34" charset="-128"/>
+              </a:rPr>
+              <a:t>key</a:t>
+            </a:r>
+            <a:r>
+              <a:rPr lang="it-IT" altLang="it-IT" dirty="0">
+                <a:ea typeface="ＭＳ Ｐゴシック" pitchFamily="34" charset="-128"/>
+              </a:rPr>
+              <a:t> </a:t>
+            </a:r>
+            <a:r>
+              <a:rPr lang="it-IT" altLang="it-IT" dirty="0" err="1">
+                <a:ea typeface="ＭＳ Ｐゴシック" pitchFamily="34" charset="-128"/>
+              </a:rPr>
+              <a:t>will</a:t>
+            </a:r>
+            <a:r>
+              <a:rPr lang="it-IT" altLang="it-IT" dirty="0">
+                <a:ea typeface="ＭＳ Ｐゴシック" pitchFamily="34" charset="-128"/>
+              </a:rPr>
+              <a:t> be </a:t>
+            </a:r>
+            <a:r>
+              <a:rPr lang="it-IT" altLang="it-IT" dirty="0" err="1">
+                <a:ea typeface="ＭＳ Ｐゴシック" pitchFamily="34" charset="-128"/>
+              </a:rPr>
+              <a:t>handled</a:t>
+            </a:r>
+            <a:r>
+              <a:rPr lang="it-IT" altLang="it-IT" dirty="0">
+                <a:ea typeface="ＭＳ Ｐゴシック" pitchFamily="34" charset="-128"/>
+              </a:rPr>
+              <a:t> </a:t>
+            </a:r>
+            <a:r>
+              <a:rPr lang="it-IT" altLang="it-IT" dirty="0" err="1">
+                <a:ea typeface="ＭＳ Ｐゴシック" pitchFamily="34" charset="-128"/>
+              </a:rPr>
+              <a:t>only</a:t>
+            </a:r>
+            <a:r>
+              <a:rPr lang="it-IT" altLang="it-IT" dirty="0">
+                <a:ea typeface="ＭＳ Ｐゴシック" pitchFamily="34" charset="-128"/>
+              </a:rPr>
+              <a:t> by the </a:t>
+            </a:r>
+            <a:r>
+              <a:rPr lang="it-IT" altLang="it-IT" dirty="0" err="1">
+                <a:ea typeface="ＭＳ Ｐゴシック" pitchFamily="34" charset="-128"/>
+              </a:rPr>
+              <a:t>legitimate</a:t>
+            </a:r>
+            <a:r>
+              <a:rPr lang="it-IT" altLang="it-IT" dirty="0">
+                <a:ea typeface="ＭＳ Ｐゴシック" pitchFamily="34" charset="-128"/>
+              </a:rPr>
+              <a:t> </a:t>
+            </a:r>
+            <a:r>
+              <a:rPr lang="it-IT" altLang="it-IT" dirty="0" err="1">
+                <a:ea typeface="ＭＳ Ｐゴシック" pitchFamily="34" charset="-128"/>
+              </a:rPr>
+              <a:t>handler</a:t>
+            </a:r>
+            <a:r>
+              <a:rPr lang="it-IT" altLang="it-IT" dirty="0">
+                <a:ea typeface="ＭＳ Ｐゴシック" pitchFamily="34" charset="-128"/>
+              </a:rPr>
+              <a:t> (</a:t>
+            </a:r>
+            <a:r>
+              <a:rPr lang="it-IT" altLang="it-IT" dirty="0" err="1">
+                <a:ea typeface="ＭＳ Ｐゴシック" pitchFamily="34" charset="-128"/>
+              </a:rPr>
+              <a:t>legal</a:t>
+            </a:r>
+            <a:r>
+              <a:rPr lang="it-IT" altLang="it-IT" dirty="0">
+                <a:ea typeface="ＭＳ Ｐゴシック" pitchFamily="34" charset="-128"/>
+              </a:rPr>
+              <a:t> </a:t>
+            </a:r>
+            <a:r>
+              <a:rPr lang="it-IT" altLang="it-IT" dirty="0" err="1">
+                <a:ea typeface="ＭＳ Ｐゴシック" pitchFamily="34" charset="-128"/>
+              </a:rPr>
+              <a:t>assumptions</a:t>
+            </a:r>
+            <a:r>
+              <a:rPr lang="it-IT" altLang="it-IT" dirty="0">
+                <a:ea typeface="ＭＳ Ｐゴシック" pitchFamily="34" charset="-128"/>
+              </a:rPr>
+              <a:t>)</a:t>
+            </a:r>
+          </a:p>
+          <a:p>
+            <a:pPr marL="514350" indent="-514350">
+              <a:buFont typeface="Franklin Gothic Medium" pitchFamily="34" charset="0"/>
+              <a:buAutoNum type="arabicPeriod"/>
+              <a:defRPr/>
+            </a:pPr>
+            <a:r>
+              <a:rPr lang="it-IT" altLang="it-IT" dirty="0">
+                <a:ea typeface="ＭＳ Ｐゴシック" pitchFamily="34" charset="-128"/>
+              </a:rPr>
+              <a:t>Trust the </a:t>
+            </a:r>
+            <a:r>
+              <a:rPr lang="it-IT" altLang="it-IT" dirty="0" err="1">
+                <a:ea typeface="ＭＳ Ｐゴシック" pitchFamily="34" charset="-128"/>
+              </a:rPr>
+              <a:t>verifying</a:t>
+            </a:r>
+            <a:r>
+              <a:rPr lang="it-IT" altLang="it-IT" dirty="0">
+                <a:ea typeface="ＭＳ Ｐゴシック" pitchFamily="34" charset="-128"/>
+              </a:rPr>
+              <a:t> computer/browser and </a:t>
+            </a:r>
+            <a:r>
+              <a:rPr lang="it-IT" altLang="it-IT" dirty="0" err="1">
+                <a:ea typeface="ＭＳ Ｐゴシック" pitchFamily="34" charset="-128"/>
+              </a:rPr>
+              <a:t>its</a:t>
+            </a:r>
+            <a:r>
+              <a:rPr lang="it-IT" altLang="it-IT" dirty="0">
+                <a:ea typeface="ＭＳ Ｐゴシック" pitchFamily="34" charset="-128"/>
+              </a:rPr>
+              <a:t> </a:t>
+            </a:r>
+            <a:r>
+              <a:rPr lang="it-IT" altLang="it-IT" dirty="0" err="1">
+                <a:ea typeface="ＭＳ Ｐゴシック" pitchFamily="34" charset="-128"/>
+              </a:rPr>
+              <a:t>own</a:t>
+            </a:r>
+            <a:r>
+              <a:rPr lang="it-IT" altLang="it-IT" dirty="0">
+                <a:ea typeface="ＭＳ Ｐゴシック" pitchFamily="34" charset="-128"/>
+              </a:rPr>
+              <a:t> root certificate list</a:t>
+            </a:r>
+          </a:p>
+          <a:p>
+            <a:pPr marL="514350" indent="-514350">
+              <a:buFont typeface="Franklin Gothic Medium" pitchFamily="34" charset="0"/>
+              <a:buAutoNum type="arabicPeriod"/>
+              <a:defRPr/>
+            </a:pPr>
+            <a:r>
+              <a:rPr lang="it-IT" altLang="it-IT" sz="2800" dirty="0">
+                <a:ea typeface="ＭＳ Ｐゴシック" pitchFamily="34" charset="-128"/>
+              </a:rPr>
+              <a:t>The CA </a:t>
+            </a:r>
+            <a:r>
+              <a:rPr lang="it-IT" altLang="it-IT" sz="2800" dirty="0" err="1">
+                <a:ea typeface="ＭＳ Ｐゴシック" pitchFamily="34" charset="-128"/>
+              </a:rPr>
+              <a:t>trusted</a:t>
+            </a:r>
+            <a:r>
+              <a:rPr lang="it-IT" altLang="it-IT" sz="2800" dirty="0">
+                <a:ea typeface="ＭＳ Ｐゴシック" pitchFamily="34" charset="-128"/>
+              </a:rPr>
+              <a:t> list </a:t>
+            </a:r>
+            <a:r>
+              <a:rPr lang="it-IT" altLang="it-IT" sz="2800" dirty="0" err="1">
+                <a:ea typeface="ＭＳ Ｐゴシック" pitchFamily="34" charset="-128"/>
+              </a:rPr>
+              <a:t>is</a:t>
+            </a:r>
+            <a:r>
+              <a:rPr lang="it-IT" altLang="it-IT" sz="2800" dirty="0">
+                <a:ea typeface="ＭＳ Ｐゴシック" pitchFamily="34" charset="-128"/>
+              </a:rPr>
+              <a:t> </a:t>
+            </a:r>
+            <a:r>
+              <a:rPr lang="it-IT" altLang="it-IT" sz="2800" dirty="0" err="1">
+                <a:ea typeface="ＭＳ Ｐゴシック" pitchFamily="34" charset="-128"/>
+              </a:rPr>
+              <a:t>as</a:t>
+            </a:r>
+            <a:r>
+              <a:rPr lang="it-IT" altLang="it-IT" sz="2800" dirty="0">
+                <a:ea typeface="ＭＳ Ｐゴシック" pitchFamily="34" charset="-128"/>
+              </a:rPr>
+              <a:t> </a:t>
+            </a:r>
+            <a:r>
+              <a:rPr lang="it-IT" altLang="it-IT" sz="2800" dirty="0" err="1">
+                <a:ea typeface="ＭＳ Ｐゴシック" pitchFamily="34" charset="-128"/>
+              </a:rPr>
+              <a:t>weak</a:t>
+            </a:r>
+            <a:r>
+              <a:rPr lang="it-IT" altLang="it-IT" sz="2800" dirty="0">
+                <a:ea typeface="ＭＳ Ｐゴシック" pitchFamily="34" charset="-128"/>
+              </a:rPr>
+              <a:t> </a:t>
+            </a:r>
+            <a:r>
+              <a:rPr lang="it-IT" altLang="it-IT" sz="2800" dirty="0" err="1">
+                <a:ea typeface="ＭＳ Ｐゴシック" pitchFamily="34" charset="-128"/>
+              </a:rPr>
+              <a:t>as</a:t>
+            </a:r>
+            <a:r>
+              <a:rPr lang="it-IT" altLang="it-IT" sz="2800" dirty="0">
+                <a:ea typeface="ＭＳ Ｐゴシック" pitchFamily="34" charset="-128"/>
+              </a:rPr>
+              <a:t> the </a:t>
+            </a:r>
+            <a:r>
+              <a:rPr lang="it-IT" altLang="it-IT" sz="2800" dirty="0" err="1">
+                <a:ea typeface="ＭＳ Ｐゴシック" pitchFamily="34" charset="-128"/>
+              </a:rPr>
+              <a:t>weakest</a:t>
+            </a:r>
+            <a:r>
+              <a:rPr lang="it-IT" altLang="it-IT" sz="2800" dirty="0">
+                <a:ea typeface="ＭＳ Ｐゴシック" pitchFamily="34" charset="-128"/>
+              </a:rPr>
+              <a:t> CA in the </a:t>
+            </a:r>
+            <a:r>
+              <a:rPr lang="it-IT" altLang="it-IT" sz="2800" dirty="0" err="1">
+                <a:ea typeface="ＭＳ Ｐゴシック" pitchFamily="34" charset="-128"/>
+              </a:rPr>
+              <a:t>bunch</a:t>
+            </a:r>
+            <a:endParaRPr lang="it-IT" altLang="it-IT" dirty="0">
+              <a:ea typeface="ＭＳ Ｐゴシック" pitchFamily="34" charset="-128"/>
+            </a:endParaRPr>
+          </a:p>
+          <a:p>
+            <a:pPr marL="514350" indent="-514350">
+              <a:buFont typeface="Franklin Gothic Medium" pitchFamily="34" charset="0"/>
+              <a:buAutoNum type="arabicPeriod"/>
+              <a:defRPr/>
+            </a:pPr>
+            <a:r>
+              <a:rPr lang="it-IT" altLang="it-IT" dirty="0">
+                <a:ea typeface="ＭＳ Ｐゴシック" pitchFamily="34" charset="-128"/>
+              </a:rPr>
+              <a:t>Trust the </a:t>
+            </a:r>
+            <a:r>
+              <a:rPr lang="it-IT" altLang="it-IT" dirty="0" err="1">
+                <a:ea typeface="ＭＳ Ｐゴシック" pitchFamily="34" charset="-128"/>
+              </a:rPr>
+              <a:t>association</a:t>
+            </a:r>
+            <a:r>
+              <a:rPr lang="it-IT" altLang="it-IT" dirty="0">
+                <a:ea typeface="ＭＳ Ｐゴシック" pitchFamily="34" charset="-128"/>
+              </a:rPr>
+              <a:t> </a:t>
+            </a:r>
+            <a:r>
+              <a:rPr lang="it-IT" altLang="it-IT" dirty="0" err="1">
+                <a:ea typeface="ＭＳ Ｐゴシック" pitchFamily="34" charset="-128"/>
+              </a:rPr>
+              <a:t>between</a:t>
+            </a:r>
+            <a:r>
+              <a:rPr lang="it-IT" altLang="it-IT" dirty="0">
+                <a:ea typeface="ＭＳ Ｐゴシック" pitchFamily="34" charset="-128"/>
+              </a:rPr>
+              <a:t> </a:t>
+            </a:r>
+          </a:p>
+          <a:p>
             <a:pPr marL="0" indent="0">
               <a:buNone/>
               <a:defRPr/>
             </a:pPr>
             <a:r>
-              <a:rPr lang="it-IT" dirty="0">
-                <a:ea typeface="ＭＳ Ｐゴシック" pitchFamily="-107" charset="-128"/>
-              </a:rPr>
-              <a:t>5. Trust </a:t>
-            </a:r>
-            <a:r>
-              <a:rPr lang="it-IT" dirty="0" err="1">
-                <a:ea typeface="ＭＳ Ｐゴシック" pitchFamily="-107" charset="-128"/>
-              </a:rPr>
-              <a:t>that</a:t>
-            </a:r>
-            <a:r>
-              <a:rPr lang="it-IT" dirty="0">
-                <a:ea typeface="ＭＳ Ｐゴシック" pitchFamily="-107" charset="-128"/>
-              </a:rPr>
-              <a:t> CA </a:t>
-            </a:r>
-            <a:r>
-              <a:rPr lang="it-IT" dirty="0" err="1">
-                <a:ea typeface="ＭＳ Ｐゴシック" pitchFamily="-107" charset="-128"/>
-              </a:rPr>
-              <a:t>is</a:t>
-            </a:r>
-            <a:r>
-              <a:rPr lang="it-IT" dirty="0">
-                <a:ea typeface="ＭＳ Ｐゴシック" pitchFamily="-107" charset="-128"/>
-              </a:rPr>
-              <a:t> an authority on the </a:t>
-            </a:r>
-            <a:r>
-              <a:rPr lang="it-IT" dirty="0" err="1">
-                <a:ea typeface="ＭＳ Ｐゴシック" pitchFamily="-107" charset="-128"/>
-              </a:rPr>
-              <a:t>binding</a:t>
-            </a:r>
-            <a:r>
-              <a:rPr lang="it-IT" dirty="0">
-                <a:ea typeface="ＭＳ Ｐゴシック" pitchFamily="-107" charset="-128"/>
-              </a:rPr>
-              <a:t> </a:t>
-            </a:r>
-            <a:r>
-              <a:rPr lang="it-IT" dirty="0" err="1">
-                <a:ea typeface="ＭＳ Ｐゴシック" pitchFamily="-107" charset="-128"/>
-              </a:rPr>
-              <a:t>which</a:t>
-            </a:r>
-            <a:r>
-              <a:rPr lang="it-IT" dirty="0">
-                <a:ea typeface="ＭＳ Ｐゴシック" pitchFamily="-107" charset="-128"/>
-              </a:rPr>
-              <a:t> CA </a:t>
-            </a:r>
-            <a:r>
-              <a:rPr lang="it-IT" dirty="0" err="1">
-                <a:ea typeface="ＭＳ Ｐゴシック" pitchFamily="-107" charset="-128"/>
-              </a:rPr>
-              <a:t>signs</a:t>
-            </a:r>
-            <a:r>
-              <a:rPr lang="it-IT" dirty="0">
-                <a:ea typeface="ＭＳ Ｐゴシック" pitchFamily="-107" charset="-128"/>
-              </a:rPr>
-              <a:t> for (e.g. DNS, e-mail)</a:t>
+              <a:rPr lang="it-IT" altLang="it-IT" dirty="0">
+                <a:ea typeface="ＭＳ Ｐゴシック" pitchFamily="34" charset="-128"/>
+              </a:rPr>
+              <a:t>	Identity</a:t>
+            </a:r>
+            <a:r>
+              <a:rPr lang="it-IT" altLang="it-IT" dirty="0">
+                <a:ea typeface="ＭＳ Ｐゴシック" pitchFamily="34" charset="-128"/>
+                <a:sym typeface="Wingdings" pitchFamily="2" charset="2"/>
+              </a:rPr>
+              <a:t>  </a:t>
+            </a:r>
+            <a:r>
+              <a:rPr lang="it-IT" altLang="it-IT" dirty="0">
+                <a:ea typeface="ＭＳ Ｐゴシック" pitchFamily="34" charset="-128"/>
+              </a:rPr>
+              <a:t>Certificate </a:t>
             </a:r>
           </a:p>
           <a:p>
@@ -10524,273 +10381,35 @@
               <a:defRPr/>
             </a:pPr>
             <a:r>
-              <a:rPr lang="it-IT" dirty="0">
-                <a:ea typeface="ＭＳ Ｐゴシック" pitchFamily="-107" charset="-128"/>
-              </a:rPr>
-              <a:t>6. </a:t>
-            </a:r>
-            <a:r>
-              <a:rPr lang="it-IT" dirty="0" err="1">
-                <a:ea typeface="ＭＳ Ｐゴシック" pitchFamily="-107" charset="-128"/>
-              </a:rPr>
-              <a:t>Assumes</a:t>
-            </a:r>
-            <a:r>
-              <a:rPr lang="it-IT" dirty="0">
-                <a:ea typeface="ＭＳ Ｐゴシック" pitchFamily="-107" charset="-128"/>
-              </a:rPr>
-              <a:t> </a:t>
-            </a:r>
-            <a:r>
-              <a:rPr lang="it-IT" dirty="0" err="1">
-                <a:ea typeface="ＭＳ Ｐゴシック" pitchFamily="-107" charset="-128"/>
-              </a:rPr>
-              <a:t>that</a:t>
-            </a:r>
-            <a:r>
-              <a:rPr lang="it-IT" dirty="0">
-                <a:ea typeface="ＭＳ Ｐゴシック" pitchFamily="-107" charset="-128"/>
-              </a:rPr>
-              <a:t> </a:t>
-            </a:r>
-            <a:r>
-              <a:rPr lang="it-IT" dirty="0" err="1">
-                <a:ea typeface="ＭＳ Ｐゴシック" pitchFamily="-107" charset="-128"/>
-              </a:rPr>
-              <a:t>user</a:t>
-            </a:r>
-            <a:r>
-              <a:rPr lang="it-IT" dirty="0">
-                <a:ea typeface="ＭＳ Ｐゴシック" pitchFamily="-107" charset="-128"/>
-              </a:rPr>
-              <a:t> </a:t>
-            </a:r>
-            <a:r>
-              <a:rPr lang="it-IT" dirty="0" err="1">
-                <a:ea typeface="ＭＳ Ｐゴシック" pitchFamily="-107" charset="-128"/>
-              </a:rPr>
-              <a:t>understands</a:t>
-            </a:r>
-            <a:r>
-              <a:rPr lang="it-IT" dirty="0">
-                <a:ea typeface="ＭＳ Ｐゴシック" pitchFamily="-107" charset="-128"/>
-              </a:rPr>
-              <a:t> (part of) PKI</a:t>
-            </a:r>
-          </a:p>
-          <a:p>
-            <a:pPr marL="0" indent="0">
-              <a:buNone/>
-              <a:defRPr/>
-            </a:pPr>
-            <a:r>
-              <a:rPr lang="it-IT" dirty="0">
-                <a:ea typeface="ＭＳ Ｐゴシック" pitchFamily="-107" charset="-128"/>
-              </a:rPr>
-              <a:t>7. RA+CA </a:t>
-            </a:r>
-            <a:r>
-              <a:rPr lang="it-IT" dirty="0" err="1">
-                <a:ea typeface="ＭＳ Ｐゴシック" pitchFamily="-107" charset="-128"/>
-              </a:rPr>
-              <a:t>binding</a:t>
-            </a:r>
-            <a:r>
-              <a:rPr lang="it-IT" dirty="0">
-                <a:ea typeface="ＭＳ Ｐゴシック" pitchFamily="-107" charset="-128"/>
-              </a:rPr>
-              <a:t> </a:t>
-            </a:r>
-            <a:r>
-              <a:rPr lang="it-IT" dirty="0" err="1">
-                <a:ea typeface="ＭＳ Ｐゴシック" pitchFamily="-107" charset="-128"/>
-              </a:rPr>
-              <a:t>is</a:t>
-            </a:r>
-            <a:r>
-              <a:rPr lang="it-IT" dirty="0">
-                <a:ea typeface="ＭＳ Ｐゴシック" pitchFamily="-107" charset="-128"/>
-              </a:rPr>
-              <a:t> </a:t>
-            </a:r>
-            <a:r>
-              <a:rPr lang="it-IT" dirty="0" err="1">
-                <a:ea typeface="ＭＳ Ｐゴシック" pitchFamily="-107" charset="-128"/>
-              </a:rPr>
-              <a:t>trusted</a:t>
-            </a:r>
-            <a:endParaRPr lang="it-IT" dirty="0">
-              <a:ea typeface="ＭＳ Ｐゴシック" pitchFamily="-107" charset="-128"/>
-            </a:endParaRPr>
-          </a:p>
-          <a:p>
-            <a:pPr marL="0" indent="0">
-              <a:buNone/>
-              <a:defRPr/>
-            </a:pPr>
-            <a:r>
-              <a:rPr lang="it-IT" dirty="0">
-                <a:ea typeface="ＭＳ Ｐゴシック" pitchFamily="-107" charset="-128"/>
-              </a:rPr>
-              <a:t>8. RA </a:t>
-            </a:r>
-            <a:r>
-              <a:rPr lang="it-IT" dirty="0" err="1">
-                <a:ea typeface="ＭＳ Ｐゴシック" pitchFamily="-107" charset="-128"/>
-              </a:rPr>
-              <a:t>well</a:t>
-            </a:r>
-            <a:r>
-              <a:rPr lang="it-IT" dirty="0">
-                <a:ea typeface="ＭＳ Ｐゴシック" pitchFamily="-107" charset="-128"/>
-              </a:rPr>
-              <a:t> </a:t>
-            </a:r>
-            <a:r>
-              <a:rPr lang="it-IT" dirty="0" err="1">
-                <a:ea typeface="ＭＳ Ｐゴシック" pitchFamily="-107" charset="-128"/>
-              </a:rPr>
-              <a:t>identifies</a:t>
-            </a:r>
-            <a:r>
-              <a:rPr lang="it-IT" dirty="0">
-                <a:ea typeface="ＭＳ Ｐゴシック" pitchFamily="-107" charset="-128"/>
-              </a:rPr>
-              <a:t> the certificate </a:t>
-            </a:r>
-            <a:r>
-              <a:rPr lang="it-IT" dirty="0" err="1">
-                <a:ea typeface="ＭＳ Ｐゴシック" pitchFamily="-107" charset="-128"/>
-              </a:rPr>
-              <a:t>requester</a:t>
-            </a:r>
-            <a:endParaRPr lang="it-IT" dirty="0">
-              <a:ea typeface="ＭＳ Ｐゴシック" pitchFamily="-107" charset="-128"/>
-            </a:endParaRPr>
-          </a:p>
-          <a:p>
-            <a:pPr marL="0" indent="0">
-              <a:buNone/>
-              <a:defRPr/>
-            </a:pPr>
-            <a:r>
-              <a:rPr lang="it-IT" dirty="0">
-                <a:ea typeface="ＭＳ Ｐゴシック" pitchFamily="-107" charset="-128"/>
-              </a:rPr>
-              <a:t>9. Certificate </a:t>
-            </a:r>
-            <a:r>
-              <a:rPr lang="it-IT" dirty="0" err="1">
-                <a:ea typeface="ＭＳ Ｐゴシック" pitchFamily="-107" charset="-128"/>
-              </a:rPr>
-              <a:t>practices</a:t>
-            </a:r>
-            <a:r>
-              <a:rPr lang="it-IT" dirty="0">
-                <a:ea typeface="ＭＳ Ｐゴシック" pitchFamily="-107" charset="-128"/>
-              </a:rPr>
-              <a:t> (CSP) are </a:t>
-            </a:r>
-            <a:r>
-              <a:rPr lang="it-IT" dirty="0" err="1">
-                <a:ea typeface="ＭＳ Ｐゴシック" pitchFamily="-107" charset="-128"/>
-              </a:rPr>
-              <a:t>respected</a:t>
-            </a:r>
-            <a:endParaRPr lang="it-IT" dirty="0">
-              <a:ea typeface="ＭＳ Ｐゴシック" pitchFamily="-107" charset="-128"/>
-            </a:endParaRPr>
-          </a:p>
-          <a:p>
-            <a:pPr marL="0" indent="0">
-              <a:buNone/>
-              <a:defRPr/>
-            </a:pPr>
-            <a:r>
-              <a:rPr lang="it-IT" dirty="0">
-                <a:ea typeface="ＭＳ Ｐゴシック" pitchFamily="-107" charset="-128"/>
-              </a:rPr>
-              <a:t>10. Single </a:t>
-            </a:r>
-            <a:r>
-              <a:rPr lang="it-IT" dirty="0" err="1">
-                <a:ea typeface="ＭＳ Ｐゴシック" pitchFamily="-107" charset="-128"/>
-              </a:rPr>
-              <a:t>sign</a:t>
-            </a:r>
-            <a:r>
-              <a:rPr lang="it-IT" dirty="0">
-                <a:ea typeface="ＭＳ Ｐゴシック" pitchFamily="-107" charset="-128"/>
-              </a:rPr>
-              <a:t>-on </a:t>
-            </a:r>
-            <a:r>
-              <a:rPr lang="it-IT" dirty="0" err="1">
-                <a:ea typeface="ＭＳ Ｐゴシック" pitchFamily="-107" charset="-128"/>
-              </a:rPr>
-              <a:t>practices</a:t>
-            </a:r>
-            <a:r>
-              <a:rPr lang="it-IT" dirty="0">
-                <a:ea typeface="ＭＳ Ｐゴシック" pitchFamily="-107" charset="-128"/>
-              </a:rPr>
-              <a:t> are a </a:t>
-            </a:r>
-            <a:r>
-              <a:rPr lang="it-IT" dirty="0" err="1">
-                <a:ea typeface="ＭＳ Ｐゴシック" pitchFamily="-107" charset="-128"/>
-              </a:rPr>
-              <a:t>problem</a:t>
-            </a:r>
-            <a:endParaRPr lang="it-IT" dirty="0">
-              <a:ea typeface="ＭＳ Ｐゴシック" pitchFamily="-107" charset="-128"/>
-            </a:endParaRPr>
-          </a:p>
-          <a:p>
-            <a:pPr marL="0" indent="0">
-              <a:buNone/>
-              <a:defRPr/>
-            </a:pPr>
-            <a:endParaRPr lang="it-IT" dirty="0">
-              <a:ea typeface="ＭＳ Ｐゴシック" pitchFamily="-107" charset="-128"/>
-            </a:endParaRPr>
-          </a:p>
-          <a:p>
-            <a:pPr marL="0" indent="0">
-              <a:buNone/>
-              <a:defRPr/>
-            </a:pPr>
-            <a:endParaRPr lang="it-IT" dirty="0">
-              <a:ea typeface="ＭＳ Ｐゴシック" pitchFamily="-107" charset="-128"/>
-            </a:endParaRPr>
-          </a:p>
-          <a:p>
-            <a:pPr marL="0" indent="0">
-              <a:buNone/>
-              <a:defRPr/>
-            </a:pPr>
-            <a:endParaRPr lang="it-IT" dirty="0">
-              <a:ea typeface="ＭＳ Ｐゴシック" pitchFamily="-107" charset="-128"/>
-            </a:endParaRPr>
-          </a:p>
-          <a:p>
-            <a:pPr marL="514350" indent="-514350">
-              <a:buFont typeface="+mj-lt"/>
-              <a:buAutoNum type="arabicPeriod"/>
-              <a:defRPr/>
-            </a:pPr>
-            <a:endParaRPr lang="it-IT" sz="3600" dirty="0">
-              <a:ea typeface="ＭＳ Ｐゴシック" pitchFamily="-107" charset="-128"/>
-            </a:endParaRPr>
-          </a:p>
-          <a:p>
-            <a:pPr marL="0" indent="0">
-              <a:buNone/>
-              <a:defRPr/>
-            </a:pPr>
-            <a:endParaRPr lang="it-IT" dirty="0">
-              <a:ea typeface="ＭＳ Ｐゴシック" pitchFamily="-107" charset="-128"/>
-            </a:endParaRPr>
+              <a:rPr lang="it-IT" altLang="it-IT" dirty="0">
+                <a:ea typeface="ＭＳ Ｐゴシック" pitchFamily="34" charset="-128"/>
+              </a:rPr>
+              <a:t>	(</a:t>
+            </a:r>
+            <a:r>
+              <a:rPr lang="it-IT" altLang="it-IT" dirty="0" err="1">
+                <a:ea typeface="ＭＳ Ｐゴシック" pitchFamily="34" charset="-128"/>
+              </a:rPr>
+              <a:t>homonymies</a:t>
+            </a:r>
+            <a:r>
+              <a:rPr lang="it-IT" altLang="it-IT" dirty="0">
+                <a:ea typeface="ＭＳ Ｐゴシック" pitchFamily="34" charset="-128"/>
+              </a:rPr>
+              <a:t> are </a:t>
+            </a:r>
+            <a:r>
+              <a:rPr lang="it-IT" altLang="it-IT" dirty="0" err="1">
+                <a:ea typeface="ＭＳ Ｐゴシック" pitchFamily="34" charset="-128"/>
+              </a:rPr>
+              <a:t>possible</a:t>
+            </a:r>
+            <a:r>
+              <a:rPr lang="it-IT" altLang="it-IT" dirty="0">
+                <a:ea typeface="ＭＳ Ｐゴシック" pitchFamily="34" charset="-128"/>
+              </a:rPr>
+              <a:t>)</a:t>
+            </a:r>
           </a:p>
         </p:txBody>
       </p:sp>
@@ -10803,6 +10422,432 @@
 </file>
 
 <file path=ppt/slides/slide28.xml><?xml version="1.0" encoding="utf-8"?>
+<p:sld xmlns:a="http://schemas.openxmlformats.org/drawingml/2006/main" xmlns:r="http://schemas.openxmlformats.org/officeDocument/2006/relationships" xmlns:p="http://schemas.openxmlformats.org/presentationml/2006/main">
+  <p:cSld>
+    <p:spTree>
+      <p:nvGrpSpPr>
+        <p:cNvPr id="1" name=""/>
+        <p:cNvGrpSpPr/>
+        <p:nvPr/>
+      </p:nvGrpSpPr>
+      <p:grpSpPr>
+        <a:xfrm>
+          <a:off x="0" y="0"/>
+          <a:ext cx="0" cy="0"/>
+          <a:chOff x="0" y="0"/>
+          <a:chExt cx="0" cy="0"/>
+        </a:xfrm>
+      </p:grpSpPr>
+      <p:sp>
+        <p:nvSpPr>
+          <p:cNvPr id="84994" name="Titolo 1">
+            <a:extLst>
+              <a:ext uri="{FF2B5EF4-FFF2-40B4-BE49-F238E27FC236}">
+                <a16:creationId xmlns:a16="http://schemas.microsoft.com/office/drawing/2014/main" id="{AD88CBA9-D587-4A5A-91E0-D6DA5200B6B4}"/>
+              </a:ext>
+            </a:extLst>
+          </p:cNvPr>
+          <p:cNvSpPr>
+            <a:spLocks noGrp="1"/>
+          </p:cNvSpPr>
+          <p:nvPr>
+            <p:ph type="title"/>
+          </p:nvPr>
+        </p:nvSpPr>
+        <p:spPr/>
+        <p:txBody>
+          <a:bodyPr/>
+          <a:lstStyle/>
+          <a:p>
+            <a:pPr eaLnBrk="1" hangingPunct="1"/>
+            <a:r>
+              <a:rPr lang="it-IT" altLang="it-IT">
+                <a:ea typeface="MS PGothic" panose="020B0600070205080204" pitchFamily="34" charset="-128"/>
+              </a:rPr>
+              <a:t>PKI Assumptions #2</a:t>
+            </a:r>
+          </a:p>
+        </p:txBody>
+      </p:sp>
+      <p:sp>
+        <p:nvSpPr>
+          <p:cNvPr id="3" name="Segnaposto contenuto 2">
+            <a:extLst>
+              <a:ext uri="{FF2B5EF4-FFF2-40B4-BE49-F238E27FC236}">
+                <a16:creationId xmlns:a16="http://schemas.microsoft.com/office/drawing/2014/main" id="{14D4D58E-F411-4F7C-8768-20F3523A814E}"/>
+              </a:ext>
+            </a:extLst>
+          </p:cNvPr>
+          <p:cNvSpPr>
+            <a:spLocks noGrp="1"/>
+          </p:cNvSpPr>
+          <p:nvPr>
+            <p:ph idx="1"/>
+          </p:nvPr>
+        </p:nvSpPr>
+        <p:spPr/>
+        <p:txBody>
+          <a:bodyPr rtlCol="0">
+            <a:normAutofit/>
+          </a:bodyPr>
+          <a:lstStyle/>
+          <a:p>
+            <a:pPr marL="0" indent="0">
+              <a:buNone/>
+              <a:defRPr/>
+            </a:pPr>
+            <a:r>
+              <a:rPr lang="it-IT" dirty="0">
+                <a:ea typeface="ＭＳ Ｐゴシック" pitchFamily="-107" charset="-128"/>
+              </a:rPr>
+              <a:t>5. Trust </a:t>
+            </a:r>
+            <a:r>
+              <a:rPr lang="it-IT" dirty="0" err="1">
+                <a:ea typeface="ＭＳ Ｐゴシック" pitchFamily="-107" charset="-128"/>
+              </a:rPr>
+              <a:t>that</a:t>
+            </a:r>
+            <a:r>
+              <a:rPr lang="it-IT" dirty="0">
+                <a:ea typeface="ＭＳ Ｐゴシック" pitchFamily="-107" charset="-128"/>
+              </a:rPr>
+              <a:t> CA </a:t>
+            </a:r>
+            <a:r>
+              <a:rPr lang="it-IT" dirty="0" err="1">
+                <a:ea typeface="ＭＳ Ｐゴシック" pitchFamily="-107" charset="-128"/>
+              </a:rPr>
+              <a:t>is</a:t>
+            </a:r>
+            <a:r>
+              <a:rPr lang="it-IT" dirty="0">
+                <a:ea typeface="ＭＳ Ｐゴシック" pitchFamily="-107" charset="-128"/>
+              </a:rPr>
+              <a:t> an authority on the </a:t>
+            </a:r>
+            <a:r>
+              <a:rPr lang="it-IT" dirty="0" err="1">
+                <a:ea typeface="ＭＳ Ｐゴシック" pitchFamily="-107" charset="-128"/>
+              </a:rPr>
+              <a:t>binding</a:t>
+            </a:r>
+            <a:r>
+              <a:rPr lang="it-IT" dirty="0">
+                <a:ea typeface="ＭＳ Ｐゴシック" pitchFamily="-107" charset="-128"/>
+              </a:rPr>
+              <a:t> </a:t>
+            </a:r>
+            <a:r>
+              <a:rPr lang="it-IT" dirty="0" err="1">
+                <a:ea typeface="ＭＳ Ｐゴシック" pitchFamily="-107" charset="-128"/>
+              </a:rPr>
+              <a:t>which</a:t>
+            </a:r>
+            <a:r>
+              <a:rPr lang="it-IT" dirty="0">
+                <a:ea typeface="ＭＳ Ｐゴシック" pitchFamily="-107" charset="-128"/>
+              </a:rPr>
+              <a:t> CA </a:t>
+            </a:r>
+            <a:r>
+              <a:rPr lang="it-IT" dirty="0" err="1">
+                <a:ea typeface="ＭＳ Ｐゴシック" pitchFamily="-107" charset="-128"/>
+              </a:rPr>
+              <a:t>signs</a:t>
+            </a:r>
+            <a:r>
+              <a:rPr lang="it-IT" dirty="0">
+                <a:ea typeface="ＭＳ Ｐゴシック" pitchFamily="-107" charset="-128"/>
+              </a:rPr>
+              <a:t> for (e.g. DNS, e-mail)</a:t>
+            </a:r>
+          </a:p>
+          <a:p>
+            <a:pPr marL="0" indent="0">
+              <a:buNone/>
+              <a:defRPr/>
+            </a:pPr>
+            <a:r>
+              <a:rPr lang="it-IT" dirty="0">
+                <a:ea typeface="ＭＳ Ｐゴシック" pitchFamily="-107" charset="-128"/>
+              </a:rPr>
+              <a:t>6. </a:t>
+            </a:r>
+            <a:r>
+              <a:rPr lang="it-IT" dirty="0" err="1">
+                <a:ea typeface="ＭＳ Ｐゴシック" pitchFamily="-107" charset="-128"/>
+              </a:rPr>
+              <a:t>Assumes</a:t>
+            </a:r>
+            <a:r>
+              <a:rPr lang="it-IT" dirty="0">
+                <a:ea typeface="ＭＳ Ｐゴシック" pitchFamily="-107" charset="-128"/>
+              </a:rPr>
+              <a:t> </a:t>
+            </a:r>
+            <a:r>
+              <a:rPr lang="it-IT" dirty="0" err="1">
+                <a:ea typeface="ＭＳ Ｐゴシック" pitchFamily="-107" charset="-128"/>
+              </a:rPr>
+              <a:t>that</a:t>
+            </a:r>
+            <a:r>
+              <a:rPr lang="it-IT" dirty="0">
+                <a:ea typeface="ＭＳ Ｐゴシック" pitchFamily="-107" charset="-128"/>
+              </a:rPr>
+              <a:t> </a:t>
+            </a:r>
+            <a:r>
+              <a:rPr lang="it-IT" dirty="0" err="1">
+                <a:ea typeface="ＭＳ Ｐゴシック" pitchFamily="-107" charset="-128"/>
+              </a:rPr>
+              <a:t>user</a:t>
+            </a:r>
+            <a:r>
+              <a:rPr lang="it-IT" dirty="0">
+                <a:ea typeface="ＭＳ Ｐゴシック" pitchFamily="-107" charset="-128"/>
+              </a:rPr>
+              <a:t> </a:t>
+            </a:r>
+            <a:r>
+              <a:rPr lang="it-IT" dirty="0" err="1">
+                <a:ea typeface="ＭＳ Ｐゴシック" pitchFamily="-107" charset="-128"/>
+              </a:rPr>
+              <a:t>understands</a:t>
+            </a:r>
+            <a:r>
+              <a:rPr lang="it-IT" dirty="0">
+                <a:ea typeface="ＭＳ Ｐゴシック" pitchFamily="-107" charset="-128"/>
+              </a:rPr>
+              <a:t> (part of) PKI</a:t>
+            </a:r>
+          </a:p>
+          <a:p>
+            <a:pPr marL="0" indent="0">
+              <a:buNone/>
+              <a:defRPr/>
+            </a:pPr>
+            <a:r>
+              <a:rPr lang="it-IT" dirty="0">
+                <a:ea typeface="ＭＳ Ｐゴシック" pitchFamily="-107" charset="-128"/>
+              </a:rPr>
+              <a:t>7. RA+CA </a:t>
+            </a:r>
+            <a:r>
+              <a:rPr lang="it-IT" dirty="0" err="1">
+                <a:ea typeface="ＭＳ Ｐゴシック" pitchFamily="-107" charset="-128"/>
+              </a:rPr>
+              <a:t>binding</a:t>
+            </a:r>
+            <a:r>
+              <a:rPr lang="it-IT" dirty="0">
+                <a:ea typeface="ＭＳ Ｐゴシック" pitchFamily="-107" charset="-128"/>
+              </a:rPr>
+              <a:t> </a:t>
+            </a:r>
+            <a:r>
+              <a:rPr lang="it-IT" dirty="0" err="1">
+                <a:ea typeface="ＭＳ Ｐゴシック" pitchFamily="-107" charset="-128"/>
+              </a:rPr>
+              <a:t>is</a:t>
+            </a:r>
+            <a:r>
+              <a:rPr lang="it-IT" dirty="0">
+                <a:ea typeface="ＭＳ Ｐゴシック" pitchFamily="-107" charset="-128"/>
+              </a:rPr>
+              <a:t> </a:t>
+            </a:r>
+            <a:r>
+              <a:rPr lang="it-IT" dirty="0" err="1">
+                <a:ea typeface="ＭＳ Ｐゴシック" pitchFamily="-107" charset="-128"/>
+              </a:rPr>
+              <a:t>trusted</a:t>
+            </a:r>
+            <a:endParaRPr lang="it-IT" dirty="0">
+              <a:ea typeface="ＭＳ Ｐゴシック" pitchFamily="-107" charset="-128"/>
+            </a:endParaRPr>
+          </a:p>
+          <a:p>
+            <a:pPr marL="0" indent="0">
+              <a:buNone/>
+              <a:defRPr/>
+            </a:pPr>
+            <a:r>
+              <a:rPr lang="it-IT" dirty="0">
+                <a:ea typeface="ＭＳ Ｐゴシック" pitchFamily="-107" charset="-128"/>
+              </a:rPr>
+              <a:t>8. RA </a:t>
+            </a:r>
+            <a:r>
+              <a:rPr lang="it-IT" dirty="0" err="1">
+                <a:ea typeface="ＭＳ Ｐゴシック" pitchFamily="-107" charset="-128"/>
+              </a:rPr>
+              <a:t>well</a:t>
+            </a:r>
+            <a:r>
+              <a:rPr lang="it-IT" dirty="0">
+                <a:ea typeface="ＭＳ Ｐゴシック" pitchFamily="-107" charset="-128"/>
+              </a:rPr>
+              <a:t> </a:t>
+            </a:r>
+            <a:r>
+              <a:rPr lang="it-IT" dirty="0" err="1">
+                <a:ea typeface="ＭＳ Ｐゴシック" pitchFamily="-107" charset="-128"/>
+              </a:rPr>
+              <a:t>identifies</a:t>
+            </a:r>
+            <a:r>
+              <a:rPr lang="it-IT" dirty="0">
+                <a:ea typeface="ＭＳ Ｐゴシック" pitchFamily="-107" charset="-128"/>
+              </a:rPr>
+              <a:t> the certificate </a:t>
+            </a:r>
+            <a:r>
+              <a:rPr lang="it-IT" dirty="0" err="1">
+                <a:ea typeface="ＭＳ Ｐゴシック" pitchFamily="-107" charset="-128"/>
+              </a:rPr>
+              <a:t>requester</a:t>
+            </a:r>
+            <a:endParaRPr lang="it-IT" dirty="0">
+              <a:ea typeface="ＭＳ Ｐゴシック" pitchFamily="-107" charset="-128"/>
+            </a:endParaRPr>
+          </a:p>
+          <a:p>
+            <a:pPr marL="0" indent="0">
+              <a:buNone/>
+              <a:defRPr/>
+            </a:pPr>
+            <a:r>
+              <a:rPr lang="it-IT" dirty="0">
+                <a:ea typeface="ＭＳ Ｐゴシック" pitchFamily="-107" charset="-128"/>
+              </a:rPr>
+              <a:t>9. Certificate </a:t>
+            </a:r>
+            <a:r>
+              <a:rPr lang="it-IT" dirty="0" err="1">
+                <a:ea typeface="ＭＳ Ｐゴシック" pitchFamily="-107" charset="-128"/>
+              </a:rPr>
+              <a:t>practices</a:t>
+            </a:r>
+            <a:r>
+              <a:rPr lang="it-IT" dirty="0">
+                <a:ea typeface="ＭＳ Ｐゴシック" pitchFamily="-107" charset="-128"/>
+              </a:rPr>
+              <a:t> (CSP) are </a:t>
+            </a:r>
+            <a:r>
+              <a:rPr lang="it-IT" dirty="0" err="1">
+                <a:ea typeface="ＭＳ Ｐゴシック" pitchFamily="-107" charset="-128"/>
+              </a:rPr>
+              <a:t>respected</a:t>
+            </a:r>
+            <a:endParaRPr lang="it-IT" dirty="0">
+              <a:ea typeface="ＭＳ Ｐゴシック" pitchFamily="-107" charset="-128"/>
+            </a:endParaRPr>
+          </a:p>
+          <a:p>
+            <a:pPr marL="0" indent="0">
+              <a:buNone/>
+              <a:defRPr/>
+            </a:pPr>
+            <a:r>
+              <a:rPr lang="it-IT" dirty="0">
+                <a:ea typeface="ＭＳ Ｐゴシック" pitchFamily="-107" charset="-128"/>
+              </a:rPr>
+              <a:t>10. Single </a:t>
+            </a:r>
+            <a:r>
+              <a:rPr lang="it-IT" dirty="0" err="1">
+                <a:ea typeface="ＭＳ Ｐゴシック" pitchFamily="-107" charset="-128"/>
+              </a:rPr>
+              <a:t>sign</a:t>
+            </a:r>
+            <a:r>
+              <a:rPr lang="it-IT" dirty="0">
+                <a:ea typeface="ＭＳ Ｐゴシック" pitchFamily="-107" charset="-128"/>
+              </a:rPr>
+              <a:t>-on </a:t>
+            </a:r>
+            <a:r>
+              <a:rPr lang="it-IT" dirty="0" err="1">
+                <a:ea typeface="ＭＳ Ｐゴシック" pitchFamily="-107" charset="-128"/>
+              </a:rPr>
+              <a:t>practices</a:t>
+            </a:r>
+            <a:r>
+              <a:rPr lang="it-IT" dirty="0">
+                <a:ea typeface="ＭＳ Ｐゴシック" pitchFamily="-107" charset="-128"/>
+              </a:rPr>
+              <a:t> are a </a:t>
+            </a:r>
+            <a:r>
+              <a:rPr lang="it-IT" dirty="0" err="1">
+                <a:ea typeface="ＭＳ Ｐゴシック" pitchFamily="-107" charset="-128"/>
+              </a:rPr>
+              <a:t>problem</a:t>
+            </a:r>
+            <a:endParaRPr lang="it-IT" dirty="0">
+              <a:ea typeface="ＭＳ Ｐゴシック" pitchFamily="-107" charset="-128"/>
+            </a:endParaRPr>
+          </a:p>
+          <a:p>
+            <a:pPr marL="0" indent="0">
+              <a:buNone/>
+              <a:defRPr/>
+            </a:pPr>
+            <a:endParaRPr lang="it-IT" dirty="0">
+              <a:ea typeface="ＭＳ Ｐゴシック" pitchFamily="-107" charset="-128"/>
+            </a:endParaRPr>
+          </a:p>
+          <a:p>
+            <a:pPr marL="0" indent="0">
+              <a:buNone/>
+              <a:defRPr/>
+            </a:pPr>
+            <a:endParaRPr lang="it-IT" dirty="0">
+              <a:ea typeface="ＭＳ Ｐゴシック" pitchFamily="-107" charset="-128"/>
+            </a:endParaRPr>
+          </a:p>
+          <a:p>
+            <a:pPr marL="0" indent="0">
+              <a:buNone/>
+              <a:defRPr/>
+            </a:pPr>
+            <a:endParaRPr lang="it-IT" dirty="0">
+              <a:ea typeface="ＭＳ Ｐゴシック" pitchFamily="-107" charset="-128"/>
+            </a:endParaRPr>
+          </a:p>
+          <a:p>
+            <a:pPr marL="514350" indent="-514350">
+              <a:buFont typeface="+mj-lt"/>
+              <a:buAutoNum type="arabicPeriod"/>
+              <a:defRPr/>
+            </a:pPr>
+            <a:endParaRPr lang="it-IT" sz="3600" dirty="0">
+              <a:ea typeface="ＭＳ Ｐゴシック" pitchFamily="-107" charset="-128"/>
+            </a:endParaRPr>
+          </a:p>
+          <a:p>
+            <a:pPr marL="0" indent="0">
+              <a:buNone/>
+              <a:defRPr/>
+            </a:pPr>
+            <a:endParaRPr lang="it-IT" dirty="0">
+              <a:ea typeface="ＭＳ Ｐゴシック" pitchFamily="-107" charset="-128"/>
+            </a:endParaRPr>
+          </a:p>
+        </p:txBody>
+      </p:sp>
+    </p:spTree>
+  </p:cSld>
+  <p:clrMapOvr>
+    <a:masterClrMapping/>
+  </p:clrMapOvr>
+</p:sld>
+</file>
+
+<file path=ppt/slides/slide29.xml><?xml version="1.0" encoding="utf-8"?>
 <p:sld xmlns:a="http://schemas.openxmlformats.org/drawingml/2006/main" xmlns:r="http://schemas.openxmlformats.org/officeDocument/2006/relationships" xmlns:p="http://schemas.openxmlformats.org/presentationml/2006/main">
   <p:cSld>
     <p:spTree>

</xml_diff>

<commit_message>
new version of slides
</commit_message>
<xml_diff>
--- a/slides/04-PKI-and-Key-distribution-2020.pptx
+++ b/slides/04-PKI-and-Key-distribution-2020.pptx
@@ -407,7 +407,7 @@
           <a:p>
             <a:fld id="{762CD6BD-7546-4E5B-AEEF-17BA2030D417}" type="datetimeFigureOut">
               <a:rPr lang="it-IT" smtClean="0"/>
-              <a:t>25/03/2024</a:t>
+              <a:t>24/03/2025</a:t>
             </a:fld>
             <a:endParaRPr lang="it-IT"/>
           </a:p>
@@ -3171,7 +3171,7 @@
           <a:p>
             <a:fld id="{DD268F46-A143-4D49-98F9-74B8259B3C7B}" type="datetimeFigureOut">
               <a:rPr lang="it-IT" smtClean="0"/>
-              <a:t>25/03/2024</a:t>
+              <a:t>24/03/2025</a:t>
             </a:fld>
             <a:endParaRPr lang="it-IT"/>
           </a:p>
@@ -3371,7 +3371,7 @@
           <a:p>
             <a:fld id="{DD268F46-A143-4D49-98F9-74B8259B3C7B}" type="datetimeFigureOut">
               <a:rPr lang="it-IT" smtClean="0"/>
-              <a:t>25/03/2024</a:t>
+              <a:t>24/03/2025</a:t>
             </a:fld>
             <a:endParaRPr lang="it-IT"/>
           </a:p>
@@ -3581,7 +3581,7 @@
           <a:p>
             <a:fld id="{DD268F46-A143-4D49-98F9-74B8259B3C7B}" type="datetimeFigureOut">
               <a:rPr lang="it-IT" smtClean="0"/>
-              <a:t>25/03/2024</a:t>
+              <a:t>24/03/2025</a:t>
             </a:fld>
             <a:endParaRPr lang="it-IT"/>
           </a:p>
@@ -3781,7 +3781,7 @@
           <a:p>
             <a:fld id="{DD268F46-A143-4D49-98F9-74B8259B3C7B}" type="datetimeFigureOut">
               <a:rPr lang="it-IT" smtClean="0"/>
-              <a:t>25/03/2024</a:t>
+              <a:t>24/03/2025</a:t>
             </a:fld>
             <a:endParaRPr lang="it-IT"/>
           </a:p>
@@ -4057,7 +4057,7 @@
           <a:p>
             <a:fld id="{DD268F46-A143-4D49-98F9-74B8259B3C7B}" type="datetimeFigureOut">
               <a:rPr lang="it-IT" smtClean="0"/>
-              <a:t>25/03/2024</a:t>
+              <a:t>24/03/2025</a:t>
             </a:fld>
             <a:endParaRPr lang="it-IT"/>
           </a:p>
@@ -4325,7 +4325,7 @@
           <a:p>
             <a:fld id="{DD268F46-A143-4D49-98F9-74B8259B3C7B}" type="datetimeFigureOut">
               <a:rPr lang="it-IT" smtClean="0"/>
-              <a:t>25/03/2024</a:t>
+              <a:t>24/03/2025</a:t>
             </a:fld>
             <a:endParaRPr lang="it-IT"/>
           </a:p>
@@ -4740,7 +4740,7 @@
           <a:p>
             <a:fld id="{DD268F46-A143-4D49-98F9-74B8259B3C7B}" type="datetimeFigureOut">
               <a:rPr lang="it-IT" smtClean="0"/>
-              <a:t>25/03/2024</a:t>
+              <a:t>24/03/2025</a:t>
             </a:fld>
             <a:endParaRPr lang="it-IT"/>
           </a:p>
@@ -4882,7 +4882,7 @@
           <a:p>
             <a:fld id="{DD268F46-A143-4D49-98F9-74B8259B3C7B}" type="datetimeFigureOut">
               <a:rPr lang="it-IT" smtClean="0"/>
-              <a:t>25/03/2024</a:t>
+              <a:t>24/03/2025</a:t>
             </a:fld>
             <a:endParaRPr lang="it-IT"/>
           </a:p>
@@ -4995,7 +4995,7 @@
           <a:p>
             <a:fld id="{DD268F46-A143-4D49-98F9-74B8259B3C7B}" type="datetimeFigureOut">
               <a:rPr lang="it-IT" smtClean="0"/>
-              <a:t>25/03/2024</a:t>
+              <a:t>24/03/2025</a:t>
             </a:fld>
             <a:endParaRPr lang="it-IT"/>
           </a:p>
@@ -5308,7 +5308,7 @@
           <a:p>
             <a:fld id="{DD268F46-A143-4D49-98F9-74B8259B3C7B}" type="datetimeFigureOut">
               <a:rPr lang="it-IT" smtClean="0"/>
-              <a:t>25/03/2024</a:t>
+              <a:t>24/03/2025</a:t>
             </a:fld>
             <a:endParaRPr lang="it-IT"/>
           </a:p>
@@ -5597,7 +5597,7 @@
           <a:p>
             <a:fld id="{DD268F46-A143-4D49-98F9-74B8259B3C7B}" type="datetimeFigureOut">
               <a:rPr lang="it-IT" smtClean="0"/>
-              <a:t>25/03/2024</a:t>
+              <a:t>24/03/2025</a:t>
             </a:fld>
             <a:endParaRPr lang="it-IT"/>
           </a:p>
@@ -5840,7 +5840,7 @@
           <a:p>
             <a:fld id="{DD268F46-A143-4D49-98F9-74B8259B3C7B}" type="datetimeFigureOut">
               <a:rPr lang="it-IT" smtClean="0"/>
-              <a:t>25/03/2024</a:t>
+              <a:t>24/03/2025</a:t>
             </a:fld>
             <a:endParaRPr lang="it-IT"/>
           </a:p>
@@ -7309,7 +7309,7 @@
             <a:pPr lvl="1"/>
             <a:r>
               <a:rPr lang="it-IT" altLang="it-IT" dirty="0"/>
-              <a:t>Common Name </a:t>
+              <a:t>Common Name CN </a:t>
             </a:r>
           </a:p>
           <a:p>
@@ -7324,7 +7324,7 @@
             </a:r>
             <a:r>
               <a:rPr lang="it-IT" altLang="it-IT" dirty="0"/>
-              <a:t> to the common name</a:t>
+              <a:t> to the common name CN</a:t>
             </a:r>
           </a:p>
           <a:p>
@@ -7486,7 +7486,7 @@
             </a:r>
             <a:r>
               <a:rPr lang="it-IT" altLang="it-IT" dirty="0"/>
-              <a:t> and </a:t>
+              <a:t> by X and </a:t>
             </a:r>
             <a:r>
               <a:rPr lang="it-IT" altLang="it-IT" dirty="0" err="1"/>
@@ -7498,6 +7498,21 @@
             </a:r>
           </a:p>
           <a:p>
+            <a:pPr lvl="1"/>
+            <a:r>
+              <a:rPr lang="it-IT" altLang="it-IT" dirty="0"/>
+              <a:t>The CSR </a:t>
+            </a:r>
+            <a:r>
+              <a:rPr lang="it-IT" altLang="it-IT" dirty="0" err="1"/>
+              <a:t>contains</a:t>
+            </a:r>
+            <a:r>
+              <a:rPr lang="it-IT" altLang="it-IT" dirty="0"/>
+              <a:t> PU_X</a:t>
+            </a:r>
+          </a:p>
+          <a:p>
             <a:r>
               <a:rPr lang="it-IT" altLang="it-IT" dirty="0"/>
               <a:t>A RA (</a:t>
@@ -7524,7 +7539,7 @@
             </a:r>
             <a:r>
               <a:rPr lang="it-IT" altLang="it-IT" dirty="0"/>
-              <a:t> and </a:t>
+              <a:t> from X and </a:t>
             </a:r>
             <a:r>
               <a:rPr lang="it-IT" altLang="it-IT" dirty="0" err="1"/>
@@ -7580,7 +7595,34 @@
               <a:rPr lang="it-IT" altLang="it-IT" dirty="0" err="1"/>
               <a:t>issued</a:t>
             </a:r>
-            <a:endParaRPr lang="it-IT" altLang="it-IT" dirty="0"/>
+            <a:r>
+              <a:rPr lang="it-IT" altLang="it-IT" dirty="0"/>
+              <a:t>. C </a:t>
+            </a:r>
+            <a:r>
+              <a:rPr lang="it-IT" altLang="it-IT" dirty="0" err="1"/>
+              <a:t>contains</a:t>
+            </a:r>
+            <a:r>
+              <a:rPr lang="it-IT" altLang="it-IT" dirty="0"/>
+              <a:t> PU_X, and </a:t>
+            </a:r>
+            <a:r>
+              <a:rPr lang="it-IT" altLang="it-IT" dirty="0" err="1"/>
+              <a:t>it’s</a:t>
+            </a:r>
+            <a:r>
+              <a:rPr lang="it-IT" altLang="it-IT" dirty="0"/>
+              <a:t> </a:t>
+            </a:r>
+            <a:r>
+              <a:rPr lang="it-IT" altLang="it-IT" dirty="0" err="1"/>
+              <a:t>signed</a:t>
+            </a:r>
+            <a:r>
+              <a:rPr lang="it-IT" altLang="it-IT" dirty="0"/>
+              <a:t> with PR_CA</a:t>
+            </a:r>
           </a:p>
           <a:p>
             <a:r>
@@ -7684,14 +7726,14 @@
           <a:p>
             <a:r>
               <a:rPr lang="en-US" dirty="0"/>
-              <a:t>For validating Web Sites + FQDNs</a:t>
+              <a:t>When validating Web Sites + FQDNs</a:t>
             </a:r>
           </a:p>
           <a:p>
             <a:pPr lvl="1"/>
             <a:r>
               <a:rPr lang="en-US" dirty="0"/>
-              <a:t>Proof of controlling corresponding DNS, or proof of owning the web server</a:t>
+              <a:t>X must prove to control corresponding DNS, or prove to own the web server</a:t>
             </a:r>
           </a:p>
           <a:p>
@@ -7708,14 +7750,14 @@
           <a:p>
             <a:r>
               <a:rPr lang="en-US" dirty="0"/>
-              <a:t>For validating people</a:t>
+              <a:t>When validating people</a:t>
             </a:r>
           </a:p>
           <a:p>
             <a:pPr lvl="1"/>
             <a:r>
               <a:rPr lang="en-US" dirty="0"/>
-              <a:t>Legal identification (Photo ID, webcam, etc.)</a:t>
+              <a:t>Legal identification of X (Photo ID, webcam, etc.)</a:t>
             </a:r>
             <a:endParaRPr lang="it-IT" dirty="0"/>
           </a:p>
@@ -7830,7 +7872,15 @@
             </a:r>
             <a:r>
               <a:rPr lang="it-IT" altLang="it-IT" dirty="0"/>
-              <a:t>, and </a:t>
+              <a:t> (the </a:t>
+            </a:r>
+            <a:r>
+              <a:rPr lang="it-IT" altLang="it-IT" b="1" dirty="0" err="1"/>
+              <a:t>truststore</a:t>
+            </a:r>
+            <a:r>
+              <a:rPr lang="it-IT" altLang="it-IT" dirty="0"/>
+              <a:t>), and </a:t>
             </a:r>
             <a:r>
               <a:rPr lang="it-IT" altLang="it-IT" dirty="0" err="1"/>
@@ -7938,6 +7988,14 @@
             </a:r>
             <a:r>
               <a:rPr lang="it-IT" altLang="it-IT" dirty="0"/>
+              <a:t>/</a:t>
+            </a:r>
+            <a:r>
+              <a:rPr lang="it-IT" altLang="it-IT" dirty="0" err="1"/>
+              <a:t>Truststores</a:t>
+            </a:r>
+            <a:r>
+              <a:rPr lang="it-IT" altLang="it-IT" dirty="0"/>
               <a:t> </a:t>
             </a:r>
             <a:r>
@@ -7949,7 +8007,7 @@
               <a:t> a </a:t>
             </a:r>
             <a:r>
-              <a:rPr lang="it-IT" altLang="it-IT" dirty="0">
+              <a:rPr lang="it-IT" altLang="it-IT" b="1" dirty="0">
                 <a:solidFill>
                   <a:srgbClr val="FF0000"/>
                 </a:solidFill>
@@ -8055,12 +8113,8 @@
             <a:pPr lvl="1"/>
             <a:r>
               <a:rPr lang="en-US" dirty="0"/>
-              <a:t>Almost any commercial AV does this currently</a:t>
-            </a:r>
-          </a:p>
-          <a:p>
-            <a:pPr lvl="1"/>
-            <a:endParaRPr lang="en-US" dirty="0"/>
+              <a:t>Almost any commercial AV used to this (and still does in a way or another)</a:t>
+            </a:r>
           </a:p>
           <a:p>
             <a:endParaRPr lang="it-IT" dirty="0"/>
@@ -8538,58 +8592,203 @@
           <a:lstStyle/>
           <a:p>
             <a:r>
-              <a:rPr lang="it-IT" altLang="it-IT"/>
-              <a:t>All these checks must be successful:</a:t>
+              <a:rPr lang="it-IT" altLang="it-IT" dirty="0" err="1"/>
+              <a:t>All</a:t>
+            </a:r>
+            <a:r>
+              <a:rPr lang="it-IT" altLang="it-IT" dirty="0"/>
+              <a:t> </a:t>
+            </a:r>
+            <a:r>
+              <a:rPr lang="it-IT" altLang="it-IT" dirty="0" err="1"/>
+              <a:t>these</a:t>
+            </a:r>
+            <a:r>
+              <a:rPr lang="it-IT" altLang="it-IT" dirty="0"/>
+              <a:t> checks must be </a:t>
+            </a:r>
+            <a:r>
+              <a:rPr lang="it-IT" altLang="it-IT" dirty="0" err="1"/>
+              <a:t>successful</a:t>
+            </a:r>
+            <a:r>
+              <a:rPr lang="it-IT" altLang="it-IT" dirty="0"/>
+              <a:t>:</a:t>
             </a:r>
           </a:p>
           <a:p>
             <a:pPr lvl="1"/>
             <a:r>
-              <a:rPr lang="it-IT" altLang="it-IT"/>
-              <a:t>Digest must correspond to a known and </a:t>
-            </a:r>
-            <a:r>
-              <a:rPr lang="it-IT" altLang="it-IT" b="1"/>
+              <a:rPr lang="it-IT" altLang="it-IT" dirty="0"/>
+              <a:t>Identity check: some of the </a:t>
+            </a:r>
+            <a:r>
+              <a:rPr lang="it-IT" altLang="it-IT" dirty="0" err="1"/>
+              <a:t>CNs</a:t>
+            </a:r>
+            <a:r>
+              <a:rPr lang="it-IT" altLang="it-IT" dirty="0"/>
+              <a:t> </a:t>
+            </a:r>
+            <a:r>
+              <a:rPr lang="it-IT" altLang="it-IT" dirty="0" err="1"/>
+              <a:t>should</a:t>
+            </a:r>
+            <a:r>
+              <a:rPr lang="it-IT" altLang="it-IT" dirty="0"/>
+              <a:t> match the </a:t>
+            </a:r>
+            <a:r>
+              <a:rPr lang="it-IT" altLang="it-IT" dirty="0" err="1"/>
+              <a:t>identity</a:t>
+            </a:r>
+            <a:r>
+              <a:rPr lang="it-IT" altLang="it-IT" dirty="0"/>
+              <a:t> </a:t>
+            </a:r>
+            <a:r>
+              <a:rPr lang="it-IT" altLang="it-IT" dirty="0" err="1"/>
+              <a:t>you’re</a:t>
+            </a:r>
+            <a:r>
+              <a:rPr lang="it-IT" altLang="it-IT" dirty="0"/>
+              <a:t> </a:t>
+            </a:r>
+            <a:r>
+              <a:rPr lang="it-IT" altLang="it-IT" dirty="0" err="1"/>
+              <a:t>looking</a:t>
+            </a:r>
+            <a:r>
+              <a:rPr lang="it-IT" altLang="it-IT" dirty="0"/>
+              <a:t> for</a:t>
+            </a:r>
+          </a:p>
+          <a:p>
+            <a:pPr lvl="1"/>
+            <a:r>
+              <a:rPr lang="it-IT" altLang="it-IT" dirty="0"/>
+              <a:t>Signature check: Digest must </a:t>
+            </a:r>
+            <a:r>
+              <a:rPr lang="it-IT" altLang="it-IT" dirty="0" err="1"/>
+              <a:t>correspond</a:t>
+            </a:r>
+            <a:r>
+              <a:rPr lang="it-IT" altLang="it-IT" dirty="0"/>
+              <a:t> to a </a:t>
+            </a:r>
+            <a:r>
+              <a:rPr lang="it-IT" altLang="it-IT" dirty="0" err="1"/>
+              <a:t>known</a:t>
+            </a:r>
+            <a:r>
+              <a:rPr lang="it-IT" altLang="it-IT" dirty="0"/>
+              <a:t> and </a:t>
+            </a:r>
+            <a:r>
+              <a:rPr lang="it-IT" altLang="it-IT" b="1" dirty="0" err="1"/>
               <a:t>accepted</a:t>
             </a:r>
             <a:r>
-              <a:rPr lang="it-IT" altLang="it-IT"/>
-              <a:t> public key of a CA in the keystore</a:t>
-            </a:r>
+              <a:rPr lang="it-IT" altLang="it-IT" dirty="0"/>
+              <a:t> public key of a CA in the </a:t>
+            </a:r>
+            <a:r>
+              <a:rPr lang="it-IT" altLang="it-IT" dirty="0" err="1"/>
+              <a:t>keystore</a:t>
+            </a:r>
+            <a:endParaRPr lang="it-IT" altLang="it-IT" dirty="0"/>
           </a:p>
           <a:p>
             <a:pPr lvl="1"/>
             <a:r>
-              <a:rPr lang="it-IT" altLang="it-IT"/>
-              <a:t>Validity time window must fit with </a:t>
-            </a:r>
-            <a:r>
-              <a:rPr lang="it-IT" altLang="it-IT" b="1"/>
-              <a:t>current time</a:t>
+              <a:rPr lang="it-IT" altLang="it-IT" dirty="0" err="1"/>
+              <a:t>Validity</a:t>
+            </a:r>
+            <a:r>
+              <a:rPr lang="it-IT" altLang="it-IT" dirty="0"/>
+              <a:t> time window must </a:t>
+            </a:r>
+            <a:r>
+              <a:rPr lang="it-IT" altLang="it-IT" dirty="0" err="1"/>
+              <a:t>fit</a:t>
+            </a:r>
+            <a:r>
+              <a:rPr lang="it-IT" altLang="it-IT" dirty="0"/>
+              <a:t> with </a:t>
+            </a:r>
+            <a:r>
+              <a:rPr lang="it-IT" altLang="it-IT" b="1" dirty="0" err="1"/>
+              <a:t>current</a:t>
+            </a:r>
+            <a:r>
+              <a:rPr lang="it-IT" altLang="it-IT" b="1" dirty="0"/>
+              <a:t> time</a:t>
             </a:r>
           </a:p>
           <a:p>
             <a:pPr lvl="1"/>
             <a:r>
-              <a:rPr lang="it-IT" altLang="it-IT"/>
-              <a:t>Certificate scope must match (can’t use a certificate for authorizing things not in the certificate scope)</a:t>
+              <a:rPr lang="it-IT" altLang="it-IT" dirty="0"/>
+              <a:t>Certificate scope must match (</a:t>
+            </a:r>
+            <a:r>
+              <a:rPr lang="it-IT" altLang="it-IT" dirty="0" err="1"/>
+              <a:t>can’t</a:t>
+            </a:r>
+            <a:r>
+              <a:rPr lang="it-IT" altLang="it-IT" dirty="0"/>
+              <a:t> use a certificate for </a:t>
+            </a:r>
+            <a:r>
+              <a:rPr lang="it-IT" altLang="it-IT" dirty="0" err="1"/>
+              <a:t>authorizing</a:t>
+            </a:r>
+            <a:r>
+              <a:rPr lang="it-IT" altLang="it-IT" dirty="0"/>
+              <a:t> </a:t>
+            </a:r>
+            <a:r>
+              <a:rPr lang="it-IT" altLang="it-IT" dirty="0" err="1"/>
+              <a:t>things</a:t>
+            </a:r>
+            <a:r>
+              <a:rPr lang="it-IT" altLang="it-IT" dirty="0"/>
+              <a:t> </a:t>
+            </a:r>
+            <a:r>
+              <a:rPr lang="it-IT" altLang="it-IT" dirty="0" err="1"/>
+              <a:t>not</a:t>
+            </a:r>
+            <a:r>
+              <a:rPr lang="it-IT" altLang="it-IT" dirty="0"/>
+              <a:t> in the certificate scope)</a:t>
             </a:r>
           </a:p>
           <a:p>
             <a:pPr lvl="1"/>
             <a:r>
-              <a:rPr lang="it-IT" altLang="it-IT"/>
-              <a:t>Certificate must not be </a:t>
-            </a:r>
-            <a:r>
-              <a:rPr lang="it-IT" altLang="it-IT" b="1"/>
+              <a:rPr lang="it-IT" altLang="it-IT" dirty="0"/>
+              <a:t>Certificate must </a:t>
+            </a:r>
+            <a:r>
+              <a:rPr lang="it-IT" altLang="it-IT" dirty="0" err="1"/>
+              <a:t>not</a:t>
+            </a:r>
+            <a:r>
+              <a:rPr lang="it-IT" altLang="it-IT" dirty="0"/>
+              <a:t> be </a:t>
+            </a:r>
+            <a:r>
+              <a:rPr lang="it-IT" altLang="it-IT" b="1" dirty="0" err="1"/>
               <a:t>revoked</a:t>
             </a:r>
+            <a:endParaRPr lang="it-IT" altLang="it-IT" b="1" dirty="0"/>
           </a:p>
           <a:p>
             <a:pPr lvl="1"/>
             <a:r>
-              <a:rPr lang="it-IT" altLang="it-IT" b="1"/>
+              <a:rPr lang="it-IT" altLang="it-IT" b="1" dirty="0"/>
               <a:t>Quality check must be ok</a:t>
             </a:r>
           </a:p>
@@ -9255,15 +9454,7 @@
             </a:pPr>
             <a:r>
               <a:rPr lang="it-IT" dirty="0"/>
-              <a:t>Via an OCSP server. </a:t>
-            </a:r>
-            <a:r>
-              <a:rPr lang="it-IT" dirty="0" err="1"/>
-              <a:t>It</a:t>
-            </a:r>
-            <a:r>
-              <a:rPr lang="it-IT" dirty="0"/>
-              <a:t> must be </a:t>
+              <a:t>Via an OCSP server. The OCSP server must be </a:t>
             </a:r>
             <a:r>
               <a:rPr lang="it-IT" dirty="0" err="1"/>
@@ -9363,7 +9554,17 @@
             </a:r>
             <a:r>
               <a:rPr lang="it-IT" dirty="0"/>
-              <a:t> -&gt; </a:t>
+              <a:t> </a:t>
+            </a:r>
+            <a:r>
+              <a:rPr lang="it-IT" dirty="0">
+                <a:sym typeface="Wingdings" panose="05000000000000000000" pitchFamily="2" charset="2"/>
+              </a:rPr>
+              <a:t></a:t>
+            </a:r>
+            <a:r>
+              <a:rPr lang="it-IT" dirty="0"/>
+              <a:t> </a:t>
             </a:r>
             <a:r>
               <a:rPr lang="it-IT" dirty="0" err="1"/>
@@ -9628,19 +9829,19 @@
           <a:p>
             <a:r>
               <a:rPr lang="en-US" dirty="0"/>
-              <a:t>Code signing</a:t>
+              <a:t>Code signing PKIs: accountability of software packages</a:t>
             </a:r>
           </a:p>
           <a:p>
             <a:r>
               <a:rPr lang="en-US" dirty="0"/>
-              <a:t>Public administration</a:t>
+              <a:t>Public administration PKIs: legal documents, document storage</a:t>
             </a:r>
           </a:p>
           <a:p>
             <a:r>
               <a:rPr lang="en-US" dirty="0"/>
-              <a:t>Digital Rights Management</a:t>
+              <a:t>Digital Rights Management: distribution of decoding keys, etc.</a:t>
             </a:r>
             <a:endParaRPr lang="it-IT" dirty="0"/>
           </a:p>

</xml_diff>